<commit_message>
Change icons in the LR slide
</commit_message>
<xml_diff>
--- a/portfolio/static/documents/PDE_Sprint_1.pptx
+++ b/portfolio/static/documents/PDE_Sprint_1.pptx
@@ -1113,7 +1113,7 @@
   <p:cSld>
     <p:spTree>
       <p:nvGrpSpPr>
-        <p:cNvPr id="405" name="Shape 405"/>
+        <p:cNvPr id="404" name="Shape 404"/>
         <p:cNvGrpSpPr/>
         <p:nvPr/>
       </p:nvGrpSpPr>
@@ -1127,7 +1127,7 @@
       </p:grpSpPr>
       <p:sp>
         <p:nvSpPr>
-          <p:cNvPr id="406" name="Google Shape;406;ged9256fe6f_0_163:notes"/>
+          <p:cNvPr id="405" name="Google Shape;405;ged9256fe6f_0_163:notes"/>
           <p:cNvSpPr/>
           <p:nvPr>
             <p:ph idx="2" type="sldImg"/>
@@ -1162,7 +1162,7 @@
       </p:sp>
       <p:sp>
         <p:nvSpPr>
-          <p:cNvPr id="407" name="Google Shape;407;ged9256fe6f_0_163:notes"/>
+          <p:cNvPr id="406" name="Google Shape;406;ged9256fe6f_0_163:notes"/>
           <p:cNvSpPr txBox="1"/>
           <p:nvPr>
             <p:ph idx="1" type="body"/>
@@ -1212,7 +1212,7 @@
   <p:cSld>
     <p:spTree>
       <p:nvGrpSpPr>
-        <p:cNvPr id="413" name="Shape 413"/>
+        <p:cNvPr id="412" name="Shape 412"/>
         <p:cNvGrpSpPr/>
         <p:nvPr/>
       </p:nvGrpSpPr>
@@ -1226,7 +1226,7 @@
       </p:grpSpPr>
       <p:sp>
         <p:nvSpPr>
-          <p:cNvPr id="414" name="Google Shape;414;g1340135a080_0_2:notes"/>
+          <p:cNvPr id="413" name="Google Shape;413;g1340135a080_0_2:notes"/>
           <p:cNvSpPr/>
           <p:nvPr>
             <p:ph idx="2" type="sldImg"/>
@@ -1261,7 +1261,7 @@
       </p:sp>
       <p:sp>
         <p:nvSpPr>
-          <p:cNvPr id="415" name="Google Shape;415;g1340135a080_0_2:notes"/>
+          <p:cNvPr id="414" name="Google Shape;414;g1340135a080_0_2:notes"/>
           <p:cNvSpPr txBox="1"/>
           <p:nvPr>
             <p:ph idx="1" type="body"/>
@@ -28047,7 +28047,7 @@
             <a:tbl>
               <a:tblPr>
                 <a:noFill/>
-                <a:tableStyleId>{363EE216-B138-42D0-A63F-94525CC0BD0B}</a:tableStyleId>
+                <a:tableStyleId>{AE2FC687-5EF9-485A-9C1A-490ABB51D020}</a:tableStyleId>
               </a:tblPr>
               <a:tblGrid>
                 <a:gridCol w="1267875"/>
@@ -31303,49 +31303,6 @@
         </p:nvSpPr>
         <p:spPr>
           <a:xfrm>
-            <a:off x="1984275" y="2381975"/>
-            <a:ext cx="516300" cy="516300"/>
-          </a:xfrm>
-          <a:prstGeom prst="rect">
-            <a:avLst/>
-          </a:prstGeom>
-          <a:solidFill>
-            <a:schemeClr val="lt1"/>
-          </a:solidFill>
-          <a:ln>
-            <a:noFill/>
-          </a:ln>
-        </p:spPr>
-        <p:txBody>
-          <a:bodyPr anchorCtr="0" anchor="ctr" bIns="91425" lIns="91425" spcFirstLastPara="1" rIns="91425" wrap="square" tIns="91425">
-            <a:noAutofit/>
-          </a:bodyPr>
-          <a:lstStyle/>
-          <a:p>
-            <a:pPr indent="0" lvl="0" marL="0" rtl="0" algn="l">
-              <a:spcBef>
-                <a:spcPts val="0"/>
-              </a:spcBef>
-              <a:spcAft>
-                <a:spcPts val="0"/>
-              </a:spcAft>
-              <a:buNone/>
-            </a:pPr>
-            <a:r>
-              <a:t/>
-            </a:r>
-            <a:endParaRPr/>
-          </a:p>
-        </p:txBody>
-      </p:sp>
-      <p:sp>
-        <p:nvSpPr>
-          <p:cNvPr id="367" name="Google Shape;367;p33"/>
-          <p:cNvSpPr/>
-          <p:nvPr/>
-        </p:nvSpPr>
-        <p:spPr>
-          <a:xfrm>
             <a:off x="1374675" y="1209225"/>
             <a:ext cx="516300" cy="516300"/>
           </a:xfrm>
@@ -31383,7 +31340,7 @@
       </p:sp>
       <p:sp>
         <p:nvSpPr>
-          <p:cNvPr id="368" name="Google Shape;368;p33"/>
+          <p:cNvPr id="367" name="Google Shape;367;p33"/>
           <p:cNvSpPr txBox="1"/>
           <p:nvPr>
             <p:ph type="title"/>
@@ -31423,7 +31380,7 @@
       </p:sp>
       <p:sp>
         <p:nvSpPr>
-          <p:cNvPr id="369" name="Google Shape;369;p33"/>
+          <p:cNvPr id="368" name="Google Shape;368;p33"/>
           <p:cNvSpPr txBox="1"/>
           <p:nvPr>
             <p:ph idx="1" type="subTitle"/>
@@ -31493,7 +31450,7 @@
       </p:sp>
       <p:sp>
         <p:nvSpPr>
-          <p:cNvPr id="370" name="Google Shape;370;p33"/>
+          <p:cNvPr id="369" name="Google Shape;369;p33"/>
           <p:cNvSpPr txBox="1"/>
           <p:nvPr>
             <p:ph idx="2" type="subTitle"/>
@@ -31548,7 +31505,7 @@
       </p:sp>
       <p:sp>
         <p:nvSpPr>
-          <p:cNvPr id="371" name="Google Shape;371;p33"/>
+          <p:cNvPr id="370" name="Google Shape;370;p33"/>
           <p:cNvSpPr txBox="1"/>
           <p:nvPr>
             <p:ph idx="3" type="subTitle"/>
@@ -31618,7 +31575,7 @@
       </p:sp>
       <p:sp>
         <p:nvSpPr>
-          <p:cNvPr id="372" name="Google Shape;372;p33"/>
+          <p:cNvPr id="371" name="Google Shape;371;p33"/>
           <p:cNvSpPr txBox="1"/>
           <p:nvPr>
             <p:ph idx="4" type="subTitle"/>
@@ -31658,7 +31615,7 @@
       </p:sp>
       <p:sp>
         <p:nvSpPr>
-          <p:cNvPr id="373" name="Google Shape;373;p33"/>
+          <p:cNvPr id="372" name="Google Shape;372;p33"/>
           <p:cNvSpPr txBox="1"/>
           <p:nvPr>
             <p:ph idx="5" type="subTitle"/>
@@ -31698,7 +31655,7 @@
       </p:sp>
       <p:sp>
         <p:nvSpPr>
-          <p:cNvPr id="374" name="Google Shape;374;p33"/>
+          <p:cNvPr id="373" name="Google Shape;373;p33"/>
           <p:cNvSpPr txBox="1"/>
           <p:nvPr>
             <p:ph idx="6" type="subTitle"/>
@@ -31738,1510 +31695,7 @@
       </p:sp>
       <p:grpSp>
         <p:nvGrpSpPr>
-          <p:cNvPr id="375" name="Google Shape;375;p33"/>
-          <p:cNvGrpSpPr/>
-          <p:nvPr/>
-        </p:nvGrpSpPr>
-        <p:grpSpPr>
-          <a:xfrm>
-            <a:off x="2103113" y="2467625"/>
-            <a:ext cx="278600" cy="345000"/>
-            <a:chOff x="2532463" y="3657550"/>
-            <a:chExt cx="278600" cy="345000"/>
-          </a:xfrm>
-        </p:grpSpPr>
-        <p:sp>
-          <p:nvSpPr>
-            <p:cNvPr id="376" name="Google Shape;376;p33"/>
-            <p:cNvSpPr/>
-            <p:nvPr/>
-          </p:nvSpPr>
-          <p:spPr>
-            <a:xfrm>
-              <a:off x="2752363" y="3666025"/>
-              <a:ext cx="14875" cy="284225"/>
-            </a:xfrm>
-            <a:custGeom>
-              <a:rect b="b" l="l" r="r" t="t"/>
-              <a:pathLst>
-                <a:path extrusionOk="0" h="11369" w="595">
-                  <a:moveTo>
-                    <a:pt x="0" y="0"/>
-                  </a:moveTo>
-                  <a:lnTo>
-                    <a:pt x="0" y="11369"/>
-                  </a:lnTo>
-                  <a:lnTo>
-                    <a:pt x="595" y="11369"/>
-                  </a:lnTo>
-                  <a:lnTo>
-                    <a:pt x="595" y="0"/>
-                  </a:lnTo>
-                  <a:close/>
-                </a:path>
-              </a:pathLst>
-            </a:custGeom>
-            <a:solidFill>
-              <a:srgbClr val="B2B2B2"/>
-            </a:solidFill>
-            <a:ln>
-              <a:noFill/>
-            </a:ln>
-          </p:spPr>
-          <p:txBody>
-            <a:bodyPr anchorCtr="0" anchor="ctr" bIns="91425" lIns="91425" spcFirstLastPara="1" rIns="91425" wrap="square" tIns="91425">
-              <a:noAutofit/>
-            </a:bodyPr>
-            <a:lstStyle/>
-            <a:p>
-              <a:pPr indent="0" lvl="0" marL="0" rtl="0" algn="l">
-                <a:spcBef>
-                  <a:spcPts val="0"/>
-                </a:spcBef>
-                <a:spcAft>
-                  <a:spcPts val="0"/>
-                </a:spcAft>
-                <a:buNone/>
-              </a:pPr>
-              <a:r>
-                <a:t/>
-              </a:r>
-              <a:endParaRPr/>
-            </a:p>
-          </p:txBody>
-        </p:sp>
-        <p:sp>
-          <p:nvSpPr>
-            <p:cNvPr id="377" name="Google Shape;377;p33"/>
-            <p:cNvSpPr/>
-            <p:nvPr/>
-          </p:nvSpPr>
-          <p:spPr>
-            <a:xfrm>
-              <a:off x="2708538" y="3666025"/>
-              <a:ext cx="14875" cy="284225"/>
-            </a:xfrm>
-            <a:custGeom>
-              <a:rect b="b" l="l" r="r" t="t"/>
-              <a:pathLst>
-                <a:path extrusionOk="0" h="11369" w="595">
-                  <a:moveTo>
-                    <a:pt x="0" y="0"/>
-                  </a:moveTo>
-                  <a:lnTo>
-                    <a:pt x="0" y="11369"/>
-                  </a:lnTo>
-                  <a:lnTo>
-                    <a:pt x="595" y="11369"/>
-                  </a:lnTo>
-                  <a:lnTo>
-                    <a:pt x="595" y="0"/>
-                  </a:lnTo>
-                  <a:close/>
-                </a:path>
-              </a:pathLst>
-            </a:custGeom>
-            <a:solidFill>
-              <a:srgbClr val="B2B2B2"/>
-            </a:solidFill>
-            <a:ln>
-              <a:noFill/>
-            </a:ln>
-          </p:spPr>
-          <p:txBody>
-            <a:bodyPr anchorCtr="0" anchor="ctr" bIns="91425" lIns="91425" spcFirstLastPara="1" rIns="91425" wrap="square" tIns="91425">
-              <a:noAutofit/>
-            </a:bodyPr>
-            <a:lstStyle/>
-            <a:p>
-              <a:pPr indent="0" lvl="0" marL="0" rtl="0" algn="l">
-                <a:spcBef>
-                  <a:spcPts val="0"/>
-                </a:spcBef>
-                <a:spcAft>
-                  <a:spcPts val="0"/>
-                </a:spcAft>
-                <a:buNone/>
-              </a:pPr>
-              <a:r>
-                <a:t/>
-              </a:r>
-              <a:endParaRPr/>
-            </a:p>
-          </p:txBody>
-        </p:sp>
-        <p:sp>
-          <p:nvSpPr>
-            <p:cNvPr id="378" name="Google Shape;378;p33"/>
-            <p:cNvSpPr/>
-            <p:nvPr/>
-          </p:nvSpPr>
-          <p:spPr>
-            <a:xfrm>
-              <a:off x="2598588" y="3950225"/>
-              <a:ext cx="58725" cy="52325"/>
-            </a:xfrm>
-            <a:custGeom>
-              <a:rect b="b" l="l" r="r" t="t"/>
-              <a:pathLst>
-                <a:path extrusionOk="0" h="2093" w="2349">
-                  <a:moveTo>
-                    <a:pt x="1" y="1"/>
-                  </a:moveTo>
-                  <a:lnTo>
-                    <a:pt x="1" y="1795"/>
-                  </a:lnTo>
-                  <a:cubicBezTo>
-                    <a:pt x="1" y="1918"/>
-                    <a:pt x="83" y="2051"/>
-                    <a:pt x="216" y="2051"/>
-                  </a:cubicBezTo>
-                  <a:cubicBezTo>
-                    <a:pt x="257" y="2072"/>
-                    <a:pt x="288" y="2082"/>
-                    <a:pt x="313" y="2082"/>
-                  </a:cubicBezTo>
-                  <a:cubicBezTo>
-                    <a:pt x="339" y="2082"/>
-                    <a:pt x="359" y="2072"/>
-                    <a:pt x="380" y="2051"/>
-                  </a:cubicBezTo>
-                  <a:lnTo>
-                    <a:pt x="1200" y="1836"/>
-                  </a:lnTo>
-                  <a:lnTo>
-                    <a:pt x="1969" y="2051"/>
-                  </a:lnTo>
-                  <a:cubicBezTo>
-                    <a:pt x="2010" y="2092"/>
-                    <a:pt x="2010" y="2092"/>
-                    <a:pt x="2051" y="2092"/>
-                  </a:cubicBezTo>
-                  <a:cubicBezTo>
-                    <a:pt x="2133" y="2092"/>
-                    <a:pt x="2266" y="2051"/>
-                    <a:pt x="2307" y="1918"/>
-                  </a:cubicBezTo>
-                  <a:cubicBezTo>
-                    <a:pt x="2348" y="1877"/>
-                    <a:pt x="2348" y="1836"/>
-                    <a:pt x="2348" y="1795"/>
-                  </a:cubicBezTo>
-                  <a:lnTo>
-                    <a:pt x="2348" y="1"/>
-                  </a:lnTo>
-                  <a:lnTo>
-                    <a:pt x="1754" y="1"/>
-                  </a:lnTo>
-                  <a:lnTo>
-                    <a:pt x="1754" y="1405"/>
-                  </a:lnTo>
-                  <a:lnTo>
-                    <a:pt x="1241" y="1231"/>
-                  </a:lnTo>
-                  <a:lnTo>
-                    <a:pt x="1108" y="1231"/>
-                  </a:lnTo>
-                  <a:lnTo>
-                    <a:pt x="595" y="1405"/>
-                  </a:lnTo>
-                  <a:lnTo>
-                    <a:pt x="595" y="1"/>
-                  </a:lnTo>
-                  <a:close/>
-                </a:path>
-              </a:pathLst>
-            </a:custGeom>
-            <a:solidFill>
-              <a:srgbClr val="B2B2B2"/>
-            </a:solidFill>
-            <a:ln>
-              <a:noFill/>
-            </a:ln>
-          </p:spPr>
-          <p:txBody>
-            <a:bodyPr anchorCtr="0" anchor="ctr" bIns="91425" lIns="91425" spcFirstLastPara="1" rIns="91425" wrap="square" tIns="91425">
-              <a:noAutofit/>
-            </a:bodyPr>
-            <a:lstStyle/>
-            <a:p>
-              <a:pPr indent="0" lvl="0" marL="0" rtl="0" algn="l">
-                <a:spcBef>
-                  <a:spcPts val="0"/>
-                </a:spcBef>
-                <a:spcAft>
-                  <a:spcPts val="0"/>
-                </a:spcAft>
-                <a:buNone/>
-              </a:pPr>
-              <a:r>
-                <a:t/>
-              </a:r>
-              <a:endParaRPr/>
-            </a:p>
-          </p:txBody>
-        </p:sp>
-        <p:sp>
-          <p:nvSpPr>
-            <p:cNvPr id="379" name="Google Shape;379;p33"/>
-            <p:cNvSpPr/>
-            <p:nvPr/>
-          </p:nvSpPr>
-          <p:spPr>
-            <a:xfrm>
-              <a:off x="2532463" y="3657550"/>
-              <a:ext cx="278600" cy="300150"/>
-            </a:xfrm>
-            <a:custGeom>
-              <a:rect b="b" l="l" r="r" t="t"/>
-              <a:pathLst>
-                <a:path extrusionOk="0" h="12006" w="11144">
-                  <a:moveTo>
-                    <a:pt x="9606" y="595"/>
-                  </a:moveTo>
-                  <a:cubicBezTo>
-                    <a:pt x="10119" y="595"/>
-                    <a:pt x="10549" y="1026"/>
-                    <a:pt x="10549" y="1539"/>
-                  </a:cubicBezTo>
-                  <a:lnTo>
-                    <a:pt x="10549" y="10509"/>
-                  </a:lnTo>
-                  <a:cubicBezTo>
-                    <a:pt x="10549" y="11021"/>
-                    <a:pt x="10119" y="11400"/>
-                    <a:pt x="9606" y="11400"/>
-                  </a:cubicBezTo>
-                  <a:lnTo>
-                    <a:pt x="2000" y="11400"/>
-                  </a:lnTo>
-                  <a:cubicBezTo>
-                    <a:pt x="1702" y="11400"/>
-                    <a:pt x="1487" y="11195"/>
-                    <a:pt x="1487" y="10888"/>
-                  </a:cubicBezTo>
-                  <a:lnTo>
-                    <a:pt x="1487" y="10252"/>
-                  </a:lnTo>
-                  <a:lnTo>
-                    <a:pt x="2051" y="10252"/>
-                  </a:lnTo>
-                  <a:cubicBezTo>
-                    <a:pt x="2215" y="10252"/>
-                    <a:pt x="2348" y="10170"/>
-                    <a:pt x="2389" y="9996"/>
-                  </a:cubicBezTo>
-                  <a:cubicBezTo>
-                    <a:pt x="2389" y="9822"/>
-                    <a:pt x="2256" y="9658"/>
-                    <a:pt x="2092" y="9658"/>
-                  </a:cubicBezTo>
-                  <a:lnTo>
-                    <a:pt x="1487" y="9658"/>
-                  </a:lnTo>
-                  <a:lnTo>
-                    <a:pt x="1487" y="7648"/>
-                  </a:lnTo>
-                  <a:lnTo>
-                    <a:pt x="2051" y="7648"/>
-                  </a:lnTo>
-                  <a:cubicBezTo>
-                    <a:pt x="2215" y="7648"/>
-                    <a:pt x="2348" y="7556"/>
-                    <a:pt x="2389" y="7392"/>
-                  </a:cubicBezTo>
-                  <a:cubicBezTo>
-                    <a:pt x="2389" y="7218"/>
-                    <a:pt x="2256" y="7044"/>
-                    <a:pt x="2092" y="7044"/>
-                  </a:cubicBezTo>
-                  <a:lnTo>
-                    <a:pt x="1487" y="7044"/>
-                  </a:lnTo>
-                  <a:lnTo>
-                    <a:pt x="1487" y="4993"/>
-                  </a:lnTo>
-                  <a:lnTo>
-                    <a:pt x="2051" y="4993"/>
-                  </a:lnTo>
-                  <a:cubicBezTo>
-                    <a:pt x="2215" y="4993"/>
-                    <a:pt x="2348" y="4911"/>
-                    <a:pt x="2389" y="4788"/>
-                  </a:cubicBezTo>
-                  <a:cubicBezTo>
-                    <a:pt x="2389" y="4573"/>
-                    <a:pt x="2256" y="4440"/>
-                    <a:pt x="2092" y="4440"/>
-                  </a:cubicBezTo>
-                  <a:lnTo>
-                    <a:pt x="1487" y="4440"/>
-                  </a:lnTo>
-                  <a:lnTo>
-                    <a:pt x="1487" y="2389"/>
-                  </a:lnTo>
-                  <a:lnTo>
-                    <a:pt x="2051" y="2389"/>
-                  </a:lnTo>
-                  <a:cubicBezTo>
-                    <a:pt x="2215" y="2389"/>
-                    <a:pt x="2348" y="2307"/>
-                    <a:pt x="2389" y="2133"/>
-                  </a:cubicBezTo>
-                  <a:cubicBezTo>
-                    <a:pt x="2389" y="1969"/>
-                    <a:pt x="2256" y="1795"/>
-                    <a:pt x="2092" y="1795"/>
-                  </a:cubicBezTo>
-                  <a:lnTo>
-                    <a:pt x="1487" y="1795"/>
-                  </a:lnTo>
-                  <a:lnTo>
-                    <a:pt x="1487" y="1108"/>
-                  </a:lnTo>
-                  <a:cubicBezTo>
-                    <a:pt x="1487" y="811"/>
-                    <a:pt x="1702" y="595"/>
-                    <a:pt x="2000" y="595"/>
-                  </a:cubicBezTo>
-                  <a:close/>
-                  <a:moveTo>
-                    <a:pt x="2000" y="1"/>
-                  </a:moveTo>
-                  <a:cubicBezTo>
-                    <a:pt x="1405" y="1"/>
-                    <a:pt x="893" y="513"/>
-                    <a:pt x="893" y="1108"/>
-                  </a:cubicBezTo>
-                  <a:lnTo>
-                    <a:pt x="893" y="1795"/>
-                  </a:lnTo>
-                  <a:lnTo>
-                    <a:pt x="339" y="1795"/>
-                  </a:lnTo>
-                  <a:cubicBezTo>
-                    <a:pt x="165" y="1795"/>
-                    <a:pt x="42" y="1918"/>
-                    <a:pt x="42" y="2051"/>
-                  </a:cubicBezTo>
-                  <a:cubicBezTo>
-                    <a:pt x="1" y="2266"/>
-                    <a:pt x="165" y="2389"/>
-                    <a:pt x="339" y="2389"/>
-                  </a:cubicBezTo>
-                  <a:lnTo>
-                    <a:pt x="893" y="2389"/>
-                  </a:lnTo>
-                  <a:lnTo>
-                    <a:pt x="893" y="4440"/>
-                  </a:lnTo>
-                  <a:lnTo>
-                    <a:pt x="339" y="4440"/>
-                  </a:lnTo>
-                  <a:cubicBezTo>
-                    <a:pt x="165" y="4440"/>
-                    <a:pt x="42" y="4532"/>
-                    <a:pt x="42" y="4655"/>
-                  </a:cubicBezTo>
-                  <a:cubicBezTo>
-                    <a:pt x="1" y="4870"/>
-                    <a:pt x="165" y="4993"/>
-                    <a:pt x="339" y="4993"/>
-                  </a:cubicBezTo>
-                  <a:lnTo>
-                    <a:pt x="893" y="4993"/>
-                  </a:lnTo>
-                  <a:lnTo>
-                    <a:pt x="893" y="7044"/>
-                  </a:lnTo>
-                  <a:lnTo>
-                    <a:pt x="339" y="7044"/>
-                  </a:lnTo>
-                  <a:cubicBezTo>
-                    <a:pt x="165" y="7044"/>
-                    <a:pt x="42" y="7177"/>
-                    <a:pt x="42" y="7300"/>
-                  </a:cubicBezTo>
-                  <a:cubicBezTo>
-                    <a:pt x="1" y="7474"/>
-                    <a:pt x="165" y="7648"/>
-                    <a:pt x="339" y="7648"/>
-                  </a:cubicBezTo>
-                  <a:lnTo>
-                    <a:pt x="893" y="7648"/>
-                  </a:lnTo>
-                  <a:lnTo>
-                    <a:pt x="893" y="9658"/>
-                  </a:lnTo>
-                  <a:lnTo>
-                    <a:pt x="339" y="9658"/>
-                  </a:lnTo>
-                  <a:cubicBezTo>
-                    <a:pt x="165" y="9658"/>
-                    <a:pt x="42" y="9781"/>
-                    <a:pt x="42" y="9914"/>
-                  </a:cubicBezTo>
-                  <a:cubicBezTo>
-                    <a:pt x="1" y="10078"/>
-                    <a:pt x="165" y="10252"/>
-                    <a:pt x="339" y="10252"/>
-                  </a:cubicBezTo>
-                  <a:lnTo>
-                    <a:pt x="893" y="10252"/>
-                  </a:lnTo>
-                  <a:lnTo>
-                    <a:pt x="893" y="10888"/>
-                  </a:lnTo>
-                  <a:cubicBezTo>
-                    <a:pt x="893" y="11534"/>
-                    <a:pt x="1405" y="12005"/>
-                    <a:pt x="2000" y="12005"/>
-                  </a:cubicBezTo>
-                  <a:lnTo>
-                    <a:pt x="9606" y="12005"/>
-                  </a:lnTo>
-                  <a:cubicBezTo>
-                    <a:pt x="10457" y="12005"/>
-                    <a:pt x="11144" y="11318"/>
-                    <a:pt x="11144" y="10509"/>
-                  </a:cubicBezTo>
-                  <a:lnTo>
-                    <a:pt x="11144" y="1539"/>
-                  </a:lnTo>
-                  <a:cubicBezTo>
-                    <a:pt x="11144" y="688"/>
-                    <a:pt x="10457" y="1"/>
-                    <a:pt x="9606" y="1"/>
-                  </a:cubicBezTo>
-                  <a:close/>
-                </a:path>
-              </a:pathLst>
-            </a:custGeom>
-            <a:solidFill>
-              <a:srgbClr val="333333"/>
-            </a:solidFill>
-            <a:ln>
-              <a:noFill/>
-            </a:ln>
-          </p:spPr>
-          <p:txBody>
-            <a:bodyPr anchorCtr="0" anchor="ctr" bIns="91425" lIns="91425" spcFirstLastPara="1" rIns="91425" wrap="square" tIns="91425">
-              <a:noAutofit/>
-            </a:bodyPr>
-            <a:lstStyle/>
-            <a:p>
-              <a:pPr indent="0" lvl="0" marL="0" rtl="0" algn="l">
-                <a:spcBef>
-                  <a:spcPts val="0"/>
-                </a:spcBef>
-                <a:spcAft>
-                  <a:spcPts val="0"/>
-                </a:spcAft>
-                <a:buNone/>
-              </a:pPr>
-              <a:r>
-                <a:t/>
-              </a:r>
-              <a:endParaRPr/>
-            </a:p>
-          </p:txBody>
-        </p:sp>
-        <p:sp>
-          <p:nvSpPr>
-            <p:cNvPr id="380" name="Google Shape;380;p33"/>
-            <p:cNvSpPr/>
-            <p:nvPr/>
-          </p:nvSpPr>
-          <p:spPr>
-            <a:xfrm>
-              <a:off x="2619863" y="3702400"/>
-              <a:ext cx="60000" cy="14900"/>
-            </a:xfrm>
-            <a:custGeom>
-              <a:rect b="b" l="l" r="r" t="t"/>
-              <a:pathLst>
-                <a:path extrusionOk="0" h="596" w="2400">
-                  <a:moveTo>
-                    <a:pt x="349" y="1"/>
-                  </a:moveTo>
-                  <a:cubicBezTo>
-                    <a:pt x="134" y="1"/>
-                    <a:pt x="0" y="175"/>
-                    <a:pt x="41" y="339"/>
-                  </a:cubicBezTo>
-                  <a:cubicBezTo>
-                    <a:pt x="41" y="513"/>
-                    <a:pt x="175" y="595"/>
-                    <a:pt x="349" y="595"/>
-                  </a:cubicBezTo>
-                  <a:lnTo>
-                    <a:pt x="2092" y="595"/>
-                  </a:lnTo>
-                  <a:cubicBezTo>
-                    <a:pt x="2266" y="595"/>
-                    <a:pt x="2399" y="472"/>
-                    <a:pt x="2348" y="257"/>
-                  </a:cubicBezTo>
-                  <a:cubicBezTo>
-                    <a:pt x="2348" y="124"/>
-                    <a:pt x="2225" y="1"/>
-                    <a:pt x="2051" y="1"/>
-                  </a:cubicBezTo>
-                  <a:close/>
-                </a:path>
-              </a:pathLst>
-            </a:custGeom>
-            <a:solidFill>
-              <a:srgbClr val="333333"/>
-            </a:solidFill>
-            <a:ln>
-              <a:noFill/>
-            </a:ln>
-          </p:spPr>
-          <p:txBody>
-            <a:bodyPr anchorCtr="0" anchor="ctr" bIns="91425" lIns="91425" spcFirstLastPara="1" rIns="91425" wrap="square" tIns="91425">
-              <a:noAutofit/>
-            </a:bodyPr>
-            <a:lstStyle/>
-            <a:p>
-              <a:pPr indent="0" lvl="0" marL="0" rtl="0" algn="l">
-                <a:spcBef>
-                  <a:spcPts val="0"/>
-                </a:spcBef>
-                <a:spcAft>
-                  <a:spcPts val="0"/>
-                </a:spcAft>
-                <a:buNone/>
-              </a:pPr>
-              <a:r>
-                <a:t/>
-              </a:r>
-              <a:endParaRPr/>
-            </a:p>
-          </p:txBody>
-        </p:sp>
-        <p:sp>
-          <p:nvSpPr>
-            <p:cNvPr id="381" name="Google Shape;381;p33"/>
-            <p:cNvSpPr/>
-            <p:nvPr/>
-          </p:nvSpPr>
-          <p:spPr>
-            <a:xfrm>
-              <a:off x="2619863" y="3746225"/>
-              <a:ext cx="38475" cy="14900"/>
-            </a:xfrm>
-            <a:custGeom>
-              <a:rect b="b" l="l" r="r" t="t"/>
-              <a:pathLst>
-                <a:path extrusionOk="0" h="596" w="1539">
-                  <a:moveTo>
-                    <a:pt x="349" y="1"/>
-                  </a:moveTo>
-                  <a:cubicBezTo>
-                    <a:pt x="134" y="1"/>
-                    <a:pt x="0" y="165"/>
-                    <a:pt x="41" y="339"/>
-                  </a:cubicBezTo>
-                  <a:cubicBezTo>
-                    <a:pt x="41" y="513"/>
-                    <a:pt x="175" y="595"/>
-                    <a:pt x="349" y="595"/>
-                  </a:cubicBezTo>
-                  <a:lnTo>
-                    <a:pt x="1200" y="595"/>
-                  </a:lnTo>
-                  <a:cubicBezTo>
-                    <a:pt x="1374" y="595"/>
-                    <a:pt x="1538" y="421"/>
-                    <a:pt x="1497" y="257"/>
-                  </a:cubicBezTo>
-                  <a:cubicBezTo>
-                    <a:pt x="1456" y="124"/>
-                    <a:pt x="1323" y="1"/>
-                    <a:pt x="1200" y="1"/>
-                  </a:cubicBezTo>
-                  <a:close/>
-                </a:path>
-              </a:pathLst>
-            </a:custGeom>
-            <a:solidFill>
-              <a:srgbClr val="333333"/>
-            </a:solidFill>
-            <a:ln>
-              <a:noFill/>
-            </a:ln>
-          </p:spPr>
-          <p:txBody>
-            <a:bodyPr anchorCtr="0" anchor="ctr" bIns="91425" lIns="91425" spcFirstLastPara="1" rIns="91425" wrap="square" tIns="91425">
-              <a:noAutofit/>
-            </a:bodyPr>
-            <a:lstStyle/>
-            <a:p>
-              <a:pPr indent="0" lvl="0" marL="0" rtl="0" algn="l">
-                <a:spcBef>
-                  <a:spcPts val="0"/>
-                </a:spcBef>
-                <a:spcAft>
-                  <a:spcPts val="0"/>
-                </a:spcAft>
-                <a:buNone/>
-              </a:pPr>
-              <a:r>
-                <a:t/>
-              </a:r>
-              <a:endParaRPr/>
-            </a:p>
-          </p:txBody>
-        </p:sp>
-      </p:grpSp>
-      <p:grpSp>
-        <p:nvGrpSpPr>
-          <p:cNvPr id="382" name="Google Shape;382;p33"/>
-          <p:cNvGrpSpPr/>
-          <p:nvPr/>
-        </p:nvGrpSpPr>
-        <p:grpSpPr>
-          <a:xfrm>
-            <a:off x="1460838" y="1295038"/>
-            <a:ext cx="343950" cy="344675"/>
-            <a:chOff x="2509913" y="2520475"/>
-            <a:chExt cx="343950" cy="344675"/>
-          </a:xfrm>
-        </p:grpSpPr>
-        <p:sp>
-          <p:nvSpPr>
-            <p:cNvPr id="383" name="Google Shape;383;p33"/>
-            <p:cNvSpPr/>
-            <p:nvPr/>
-          </p:nvSpPr>
-          <p:spPr>
-            <a:xfrm>
-              <a:off x="2509913" y="2608825"/>
-              <a:ext cx="343950" cy="256325"/>
-            </a:xfrm>
-            <a:custGeom>
-              <a:rect b="b" l="l" r="r" t="t"/>
-              <a:pathLst>
-                <a:path extrusionOk="0" h="10253" w="13758">
-                  <a:moveTo>
-                    <a:pt x="5126" y="8674"/>
-                  </a:moveTo>
-                  <a:cubicBezTo>
-                    <a:pt x="5557" y="8674"/>
-                    <a:pt x="5977" y="8848"/>
-                    <a:pt x="6326" y="9104"/>
-                  </a:cubicBezTo>
-                  <a:cubicBezTo>
-                    <a:pt x="6233" y="9145"/>
-                    <a:pt x="6192" y="9145"/>
-                    <a:pt x="6151" y="9186"/>
-                  </a:cubicBezTo>
-                  <a:cubicBezTo>
-                    <a:pt x="5977" y="9319"/>
-                    <a:pt x="5854" y="9484"/>
-                    <a:pt x="5772" y="9658"/>
-                  </a:cubicBezTo>
-                  <a:lnTo>
-                    <a:pt x="554" y="9658"/>
-                  </a:lnTo>
-                  <a:lnTo>
-                    <a:pt x="554" y="8674"/>
-                  </a:lnTo>
-                  <a:close/>
-                  <a:moveTo>
-                    <a:pt x="13153" y="8674"/>
-                  </a:moveTo>
-                  <a:lnTo>
-                    <a:pt x="13153" y="9658"/>
-                  </a:lnTo>
-                  <a:lnTo>
-                    <a:pt x="7945" y="9658"/>
-                  </a:lnTo>
-                  <a:cubicBezTo>
-                    <a:pt x="7822" y="9401"/>
-                    <a:pt x="7648" y="9227"/>
-                    <a:pt x="7392" y="9104"/>
-                  </a:cubicBezTo>
-                  <a:cubicBezTo>
-                    <a:pt x="7730" y="8848"/>
-                    <a:pt x="8161" y="8674"/>
-                    <a:pt x="8591" y="8674"/>
-                  </a:cubicBezTo>
-                  <a:close/>
-                  <a:moveTo>
-                    <a:pt x="298" y="1"/>
-                  </a:moveTo>
-                  <a:cubicBezTo>
-                    <a:pt x="134" y="1"/>
-                    <a:pt x="1" y="134"/>
-                    <a:pt x="1" y="298"/>
-                  </a:cubicBezTo>
-                  <a:lnTo>
-                    <a:pt x="1" y="8417"/>
-                  </a:lnTo>
-                  <a:lnTo>
-                    <a:pt x="1" y="9955"/>
-                  </a:lnTo>
-                  <a:cubicBezTo>
-                    <a:pt x="1" y="10129"/>
-                    <a:pt x="134" y="10252"/>
-                    <a:pt x="298" y="10252"/>
-                  </a:cubicBezTo>
-                  <a:lnTo>
-                    <a:pt x="6028" y="10252"/>
-                  </a:lnTo>
-                  <a:cubicBezTo>
-                    <a:pt x="6151" y="10252"/>
-                    <a:pt x="6233" y="10170"/>
-                    <a:pt x="6285" y="10037"/>
-                  </a:cubicBezTo>
-                  <a:lnTo>
-                    <a:pt x="6326" y="9996"/>
-                  </a:lnTo>
-                  <a:cubicBezTo>
-                    <a:pt x="6367" y="9873"/>
-                    <a:pt x="6408" y="9740"/>
-                    <a:pt x="6541" y="9699"/>
-                  </a:cubicBezTo>
-                  <a:cubicBezTo>
-                    <a:pt x="6623" y="9617"/>
-                    <a:pt x="6746" y="9576"/>
-                    <a:pt x="6879" y="9576"/>
-                  </a:cubicBezTo>
-                  <a:cubicBezTo>
-                    <a:pt x="6961" y="9576"/>
-                    <a:pt x="7002" y="9576"/>
-                    <a:pt x="7054" y="9617"/>
-                  </a:cubicBezTo>
-                  <a:cubicBezTo>
-                    <a:pt x="7259" y="9658"/>
-                    <a:pt x="7392" y="9781"/>
-                    <a:pt x="7474" y="9996"/>
-                  </a:cubicBezTo>
-                  <a:lnTo>
-                    <a:pt x="7474" y="10037"/>
-                  </a:lnTo>
-                  <a:cubicBezTo>
-                    <a:pt x="7515" y="10170"/>
-                    <a:pt x="7648" y="10252"/>
-                    <a:pt x="7771" y="10252"/>
-                  </a:cubicBezTo>
-                  <a:lnTo>
-                    <a:pt x="13461" y="10252"/>
-                  </a:lnTo>
-                  <a:cubicBezTo>
-                    <a:pt x="13625" y="10252"/>
-                    <a:pt x="13758" y="10129"/>
-                    <a:pt x="13758" y="9955"/>
-                  </a:cubicBezTo>
-                  <a:lnTo>
-                    <a:pt x="13758" y="8376"/>
-                  </a:lnTo>
-                  <a:lnTo>
-                    <a:pt x="13758" y="8161"/>
-                  </a:lnTo>
-                  <a:lnTo>
-                    <a:pt x="13758" y="298"/>
-                  </a:lnTo>
-                  <a:cubicBezTo>
-                    <a:pt x="13758" y="134"/>
-                    <a:pt x="13625" y="1"/>
-                    <a:pt x="13461" y="1"/>
-                  </a:cubicBezTo>
-                  <a:lnTo>
-                    <a:pt x="9698" y="1"/>
-                  </a:lnTo>
-                  <a:lnTo>
-                    <a:pt x="9698" y="606"/>
-                  </a:lnTo>
-                  <a:lnTo>
-                    <a:pt x="13153" y="606"/>
-                  </a:lnTo>
-                  <a:lnTo>
-                    <a:pt x="13153" y="8079"/>
-                  </a:lnTo>
-                  <a:lnTo>
-                    <a:pt x="8591" y="8079"/>
-                  </a:lnTo>
-                  <a:cubicBezTo>
-                    <a:pt x="8079" y="8079"/>
-                    <a:pt x="7566" y="8243"/>
-                    <a:pt x="7136" y="8551"/>
-                  </a:cubicBezTo>
-                  <a:lnTo>
-                    <a:pt x="7136" y="3374"/>
-                  </a:lnTo>
-                  <a:lnTo>
-                    <a:pt x="6582" y="3374"/>
-                  </a:lnTo>
-                  <a:lnTo>
-                    <a:pt x="6582" y="8551"/>
-                  </a:lnTo>
-                  <a:cubicBezTo>
-                    <a:pt x="6151" y="8243"/>
-                    <a:pt x="5639" y="8079"/>
-                    <a:pt x="5085" y="8079"/>
-                  </a:cubicBezTo>
-                  <a:lnTo>
-                    <a:pt x="554" y="8079"/>
-                  </a:lnTo>
-                  <a:lnTo>
-                    <a:pt x="554" y="606"/>
-                  </a:lnTo>
-                  <a:lnTo>
-                    <a:pt x="4019" y="606"/>
-                  </a:lnTo>
-                  <a:lnTo>
-                    <a:pt x="4019" y="1"/>
-                  </a:lnTo>
-                  <a:close/>
-                </a:path>
-              </a:pathLst>
-            </a:custGeom>
-            <a:solidFill>
-              <a:srgbClr val="333333"/>
-            </a:solidFill>
-            <a:ln>
-              <a:noFill/>
-            </a:ln>
-          </p:spPr>
-          <p:txBody>
-            <a:bodyPr anchorCtr="0" anchor="ctr" bIns="91425" lIns="91425" spcFirstLastPara="1" rIns="91425" wrap="square" tIns="91425">
-              <a:noAutofit/>
-            </a:bodyPr>
-            <a:lstStyle/>
-            <a:p>
-              <a:pPr indent="0" lvl="0" marL="0" rtl="0" algn="l">
-                <a:spcBef>
-                  <a:spcPts val="0"/>
-                </a:spcBef>
-                <a:spcAft>
-                  <a:spcPts val="0"/>
-                </a:spcAft>
-                <a:buNone/>
-              </a:pPr>
-              <a:r>
-                <a:t/>
-              </a:r>
-              <a:endParaRPr/>
-            </a:p>
-          </p:txBody>
-        </p:sp>
-        <p:sp>
-          <p:nvSpPr>
-            <p:cNvPr id="384" name="Google Shape;384;p33"/>
-            <p:cNvSpPr/>
-            <p:nvPr/>
-          </p:nvSpPr>
-          <p:spPr>
-            <a:xfrm>
-              <a:off x="2744938" y="2658050"/>
-              <a:ext cx="65100" cy="14875"/>
-            </a:xfrm>
-            <a:custGeom>
-              <a:rect b="b" l="l" r="r" t="t"/>
-              <a:pathLst>
-                <a:path extrusionOk="0" h="595" w="2604">
-                  <a:moveTo>
-                    <a:pt x="297" y="0"/>
-                  </a:moveTo>
-                  <a:cubicBezTo>
-                    <a:pt x="123" y="0"/>
-                    <a:pt x="0" y="123"/>
-                    <a:pt x="0" y="338"/>
-                  </a:cubicBezTo>
-                  <a:cubicBezTo>
-                    <a:pt x="41" y="472"/>
-                    <a:pt x="164" y="595"/>
-                    <a:pt x="297" y="595"/>
-                  </a:cubicBezTo>
-                  <a:lnTo>
-                    <a:pt x="2266" y="595"/>
-                  </a:lnTo>
-                  <a:cubicBezTo>
-                    <a:pt x="2471" y="595"/>
-                    <a:pt x="2604" y="431"/>
-                    <a:pt x="2563" y="256"/>
-                  </a:cubicBezTo>
-                  <a:cubicBezTo>
-                    <a:pt x="2563" y="82"/>
-                    <a:pt x="2430" y="0"/>
-                    <a:pt x="2266" y="0"/>
-                  </a:cubicBezTo>
-                  <a:close/>
-                </a:path>
-              </a:pathLst>
-            </a:custGeom>
-            <a:solidFill>
-              <a:srgbClr val="333333"/>
-            </a:solidFill>
-            <a:ln>
-              <a:noFill/>
-            </a:ln>
-          </p:spPr>
-          <p:txBody>
-            <a:bodyPr anchorCtr="0" anchor="ctr" bIns="91425" lIns="91425" spcFirstLastPara="1" rIns="91425" wrap="square" tIns="91425">
-              <a:noAutofit/>
-            </a:bodyPr>
-            <a:lstStyle/>
-            <a:p>
-              <a:pPr indent="0" lvl="0" marL="0" rtl="0" algn="l">
-                <a:spcBef>
-                  <a:spcPts val="0"/>
-                </a:spcBef>
-                <a:spcAft>
-                  <a:spcPts val="0"/>
-                </a:spcAft>
-                <a:buNone/>
-              </a:pPr>
-              <a:r>
-                <a:t/>
-              </a:r>
-              <a:endParaRPr/>
-            </a:p>
-          </p:txBody>
-        </p:sp>
-        <p:sp>
-          <p:nvSpPr>
-            <p:cNvPr id="385" name="Google Shape;385;p33"/>
-            <p:cNvSpPr/>
-            <p:nvPr/>
-          </p:nvSpPr>
-          <p:spPr>
-            <a:xfrm>
-              <a:off x="2553738" y="2658050"/>
-              <a:ext cx="65125" cy="14875"/>
-            </a:xfrm>
-            <a:custGeom>
-              <a:rect b="b" l="l" r="r" t="t"/>
-              <a:pathLst>
-                <a:path extrusionOk="0" h="595" w="2605">
-                  <a:moveTo>
-                    <a:pt x="298" y="0"/>
-                  </a:moveTo>
-                  <a:cubicBezTo>
-                    <a:pt x="124" y="0"/>
-                    <a:pt x="1" y="123"/>
-                    <a:pt x="1" y="338"/>
-                  </a:cubicBezTo>
-                  <a:cubicBezTo>
-                    <a:pt x="42" y="472"/>
-                    <a:pt x="175" y="595"/>
-                    <a:pt x="298" y="595"/>
-                  </a:cubicBezTo>
-                  <a:lnTo>
-                    <a:pt x="2266" y="595"/>
-                  </a:lnTo>
-                  <a:cubicBezTo>
-                    <a:pt x="2430" y="595"/>
-                    <a:pt x="2604" y="431"/>
-                    <a:pt x="2563" y="256"/>
-                  </a:cubicBezTo>
-                  <a:cubicBezTo>
-                    <a:pt x="2522" y="82"/>
-                    <a:pt x="2389" y="0"/>
-                    <a:pt x="2266" y="0"/>
-                  </a:cubicBezTo>
-                  <a:close/>
-                </a:path>
-              </a:pathLst>
-            </a:custGeom>
-            <a:solidFill>
-              <a:srgbClr val="333333"/>
-            </a:solidFill>
-            <a:ln>
-              <a:noFill/>
-            </a:ln>
-          </p:spPr>
-          <p:txBody>
-            <a:bodyPr anchorCtr="0" anchor="ctr" bIns="91425" lIns="91425" spcFirstLastPara="1" rIns="91425" wrap="square" tIns="91425">
-              <a:noAutofit/>
-            </a:bodyPr>
-            <a:lstStyle/>
-            <a:p>
-              <a:pPr indent="0" lvl="0" marL="0" rtl="0" algn="l">
-                <a:spcBef>
-                  <a:spcPts val="0"/>
-                </a:spcBef>
-                <a:spcAft>
-                  <a:spcPts val="0"/>
-                </a:spcAft>
-                <a:buNone/>
-              </a:pPr>
-              <a:r>
-                <a:t/>
-              </a:r>
-              <a:endParaRPr/>
-            </a:p>
-          </p:txBody>
-        </p:sp>
-        <p:sp>
-          <p:nvSpPr>
-            <p:cNvPr id="386" name="Google Shape;386;p33"/>
-            <p:cNvSpPr/>
-            <p:nvPr/>
-          </p:nvSpPr>
-          <p:spPr>
-            <a:xfrm>
-              <a:off x="2553738" y="2707250"/>
-              <a:ext cx="91775" cy="14900"/>
-            </a:xfrm>
-            <a:custGeom>
-              <a:rect b="b" l="l" r="r" t="t"/>
-              <a:pathLst>
-                <a:path extrusionOk="0" h="596" w="3671">
-                  <a:moveTo>
-                    <a:pt x="298" y="0"/>
-                  </a:moveTo>
-                  <a:cubicBezTo>
-                    <a:pt x="124" y="0"/>
-                    <a:pt x="1" y="165"/>
-                    <a:pt x="1" y="339"/>
-                  </a:cubicBezTo>
-                  <a:cubicBezTo>
-                    <a:pt x="42" y="513"/>
-                    <a:pt x="175" y="595"/>
-                    <a:pt x="298" y="595"/>
-                  </a:cubicBezTo>
-                  <a:lnTo>
-                    <a:pt x="3373" y="595"/>
-                  </a:lnTo>
-                  <a:cubicBezTo>
-                    <a:pt x="3548" y="595"/>
-                    <a:pt x="3671" y="421"/>
-                    <a:pt x="3671" y="257"/>
-                  </a:cubicBezTo>
-                  <a:cubicBezTo>
-                    <a:pt x="3630" y="123"/>
-                    <a:pt x="3507" y="0"/>
-                    <a:pt x="3373" y="0"/>
-                  </a:cubicBezTo>
-                  <a:close/>
-                </a:path>
-              </a:pathLst>
-            </a:custGeom>
-            <a:solidFill>
-              <a:srgbClr val="333333"/>
-            </a:solidFill>
-            <a:ln>
-              <a:noFill/>
-            </a:ln>
-          </p:spPr>
-          <p:txBody>
-            <a:bodyPr anchorCtr="0" anchor="ctr" bIns="91425" lIns="91425" spcFirstLastPara="1" rIns="91425" wrap="square" tIns="91425">
-              <a:noAutofit/>
-            </a:bodyPr>
-            <a:lstStyle/>
-            <a:p>
-              <a:pPr indent="0" lvl="0" marL="0" rtl="0" algn="l">
-                <a:spcBef>
-                  <a:spcPts val="0"/>
-                </a:spcBef>
-                <a:spcAft>
-                  <a:spcPts val="0"/>
-                </a:spcAft>
-                <a:buNone/>
-              </a:pPr>
-              <a:r>
-                <a:t/>
-              </a:r>
-              <a:endParaRPr/>
-            </a:p>
-          </p:txBody>
-        </p:sp>
-        <p:sp>
-          <p:nvSpPr>
-            <p:cNvPr id="387" name="Google Shape;387;p33"/>
-            <p:cNvSpPr/>
-            <p:nvPr/>
-          </p:nvSpPr>
-          <p:spPr>
-            <a:xfrm>
-              <a:off x="2564513" y="2756200"/>
-              <a:ext cx="81000" cy="15150"/>
-            </a:xfrm>
-            <a:custGeom>
-              <a:rect b="b" l="l" r="r" t="t"/>
-              <a:pathLst>
-                <a:path extrusionOk="0" h="606" w="3240">
-                  <a:moveTo>
-                    <a:pt x="297" y="1"/>
-                  </a:moveTo>
-                  <a:cubicBezTo>
-                    <a:pt x="123" y="1"/>
-                    <a:pt x="0" y="175"/>
-                    <a:pt x="0" y="349"/>
-                  </a:cubicBezTo>
-                  <a:cubicBezTo>
-                    <a:pt x="41" y="513"/>
-                    <a:pt x="164" y="605"/>
-                    <a:pt x="338" y="605"/>
-                  </a:cubicBezTo>
-                  <a:lnTo>
-                    <a:pt x="2942" y="605"/>
-                  </a:lnTo>
-                  <a:cubicBezTo>
-                    <a:pt x="3117" y="605"/>
-                    <a:pt x="3240" y="431"/>
-                    <a:pt x="3240" y="257"/>
-                  </a:cubicBezTo>
-                  <a:cubicBezTo>
-                    <a:pt x="3199" y="134"/>
-                    <a:pt x="3076" y="1"/>
-                    <a:pt x="2942" y="1"/>
-                  </a:cubicBezTo>
-                  <a:close/>
-                </a:path>
-              </a:pathLst>
-            </a:custGeom>
-            <a:solidFill>
-              <a:srgbClr val="B2B2B2"/>
-            </a:solidFill>
-            <a:ln>
-              <a:noFill/>
-            </a:ln>
-          </p:spPr>
-          <p:txBody>
-            <a:bodyPr anchorCtr="0" anchor="ctr" bIns="91425" lIns="91425" spcFirstLastPara="1" rIns="91425" wrap="square" tIns="91425">
-              <a:noAutofit/>
-            </a:bodyPr>
-            <a:lstStyle/>
-            <a:p>
-              <a:pPr indent="0" lvl="0" marL="0" rtl="0" algn="l">
-                <a:spcBef>
-                  <a:spcPts val="0"/>
-                </a:spcBef>
-                <a:spcAft>
-                  <a:spcPts val="0"/>
-                </a:spcAft>
-                <a:buNone/>
-              </a:pPr>
-              <a:r>
-                <a:t/>
-              </a:r>
-              <a:endParaRPr/>
-            </a:p>
-          </p:txBody>
-        </p:sp>
-        <p:sp>
-          <p:nvSpPr>
-            <p:cNvPr id="388" name="Google Shape;388;p33"/>
-            <p:cNvSpPr/>
-            <p:nvPr/>
-          </p:nvSpPr>
-          <p:spPr>
-            <a:xfrm>
-              <a:off x="2716988" y="2707250"/>
-              <a:ext cx="93050" cy="14900"/>
-            </a:xfrm>
-            <a:custGeom>
-              <a:rect b="b" l="l" r="r" t="t"/>
-              <a:pathLst>
-                <a:path extrusionOk="0" h="596" w="3722">
-                  <a:moveTo>
-                    <a:pt x="349" y="0"/>
-                  </a:moveTo>
-                  <a:cubicBezTo>
-                    <a:pt x="134" y="0"/>
-                    <a:pt x="1" y="165"/>
-                    <a:pt x="52" y="339"/>
-                  </a:cubicBezTo>
-                  <a:cubicBezTo>
-                    <a:pt x="52" y="513"/>
-                    <a:pt x="175" y="595"/>
-                    <a:pt x="349" y="595"/>
-                  </a:cubicBezTo>
-                  <a:lnTo>
-                    <a:pt x="3384" y="595"/>
-                  </a:lnTo>
-                  <a:cubicBezTo>
-                    <a:pt x="3589" y="595"/>
-                    <a:pt x="3722" y="421"/>
-                    <a:pt x="3681" y="257"/>
-                  </a:cubicBezTo>
-                  <a:cubicBezTo>
-                    <a:pt x="3681" y="123"/>
-                    <a:pt x="3548" y="0"/>
-                    <a:pt x="3384" y="0"/>
-                  </a:cubicBezTo>
-                  <a:close/>
-                </a:path>
-              </a:pathLst>
-            </a:custGeom>
-            <a:solidFill>
-              <a:srgbClr val="B2B2B2"/>
-            </a:solidFill>
-            <a:ln>
-              <a:noFill/>
-            </a:ln>
-          </p:spPr>
-          <p:txBody>
-            <a:bodyPr anchorCtr="0" anchor="ctr" bIns="91425" lIns="91425" spcFirstLastPara="1" rIns="91425" wrap="square" tIns="91425">
-              <a:noAutofit/>
-            </a:bodyPr>
-            <a:lstStyle/>
-            <a:p>
-              <a:pPr indent="0" lvl="0" marL="0" rtl="0" algn="l">
-                <a:spcBef>
-                  <a:spcPts val="0"/>
-                </a:spcBef>
-                <a:spcAft>
-                  <a:spcPts val="0"/>
-                </a:spcAft>
-                <a:buNone/>
-              </a:pPr>
-              <a:r>
-                <a:t/>
-              </a:r>
-              <a:endParaRPr/>
-            </a:p>
-          </p:txBody>
-        </p:sp>
-        <p:sp>
-          <p:nvSpPr>
-            <p:cNvPr id="389" name="Google Shape;389;p33"/>
-            <p:cNvSpPr/>
-            <p:nvPr/>
-          </p:nvSpPr>
-          <p:spPr>
-            <a:xfrm>
-              <a:off x="2716988" y="2756200"/>
-              <a:ext cx="82300" cy="15150"/>
-            </a:xfrm>
-            <a:custGeom>
-              <a:rect b="b" l="l" r="r" t="t"/>
-              <a:pathLst>
-                <a:path extrusionOk="0" h="606" w="3292">
-                  <a:moveTo>
-                    <a:pt x="349" y="1"/>
-                  </a:moveTo>
-                  <a:cubicBezTo>
-                    <a:pt x="134" y="1"/>
-                    <a:pt x="1" y="175"/>
-                    <a:pt x="52" y="349"/>
-                  </a:cubicBezTo>
-                  <a:cubicBezTo>
-                    <a:pt x="52" y="513"/>
-                    <a:pt x="175" y="605"/>
-                    <a:pt x="349" y="605"/>
-                  </a:cubicBezTo>
-                  <a:lnTo>
-                    <a:pt x="2953" y="605"/>
-                  </a:lnTo>
-                  <a:cubicBezTo>
-                    <a:pt x="3127" y="605"/>
-                    <a:pt x="3291" y="431"/>
-                    <a:pt x="3250" y="257"/>
-                  </a:cubicBezTo>
-                  <a:cubicBezTo>
-                    <a:pt x="3209" y="134"/>
-                    <a:pt x="3076" y="1"/>
-                    <a:pt x="2953" y="1"/>
-                  </a:cubicBezTo>
-                  <a:close/>
-                </a:path>
-              </a:pathLst>
-            </a:custGeom>
-            <a:solidFill>
-              <a:srgbClr val="333333"/>
-            </a:solidFill>
-            <a:ln>
-              <a:noFill/>
-            </a:ln>
-          </p:spPr>
-          <p:txBody>
-            <a:bodyPr anchorCtr="0" anchor="ctr" bIns="91425" lIns="91425" spcFirstLastPara="1" rIns="91425" wrap="square" tIns="91425">
-              <a:noAutofit/>
-            </a:bodyPr>
-            <a:lstStyle/>
-            <a:p>
-              <a:pPr indent="0" lvl="0" marL="0" rtl="0" algn="l">
-                <a:spcBef>
-                  <a:spcPts val="0"/>
-                </a:spcBef>
-                <a:spcAft>
-                  <a:spcPts val="0"/>
-                </a:spcAft>
-                <a:buNone/>
-              </a:pPr>
-              <a:r>
-                <a:t/>
-              </a:r>
-              <a:endParaRPr/>
-            </a:p>
-          </p:txBody>
-        </p:sp>
-        <p:sp>
-          <p:nvSpPr>
-            <p:cNvPr id="390" name="Google Shape;390;p33"/>
-            <p:cNvSpPr/>
-            <p:nvPr/>
-          </p:nvSpPr>
-          <p:spPr>
-            <a:xfrm>
-              <a:off x="2548363" y="2520475"/>
-              <a:ext cx="267075" cy="179100"/>
-            </a:xfrm>
-            <a:custGeom>
-              <a:rect b="b" l="l" r="r" t="t"/>
-              <a:pathLst>
-                <a:path extrusionOk="0" h="7164" w="10683">
-                  <a:moveTo>
-                    <a:pt x="5341" y="634"/>
-                  </a:moveTo>
-                  <a:lnTo>
-                    <a:pt x="9483" y="2089"/>
-                  </a:lnTo>
-                  <a:lnTo>
-                    <a:pt x="5341" y="3494"/>
-                  </a:lnTo>
-                  <a:lnTo>
-                    <a:pt x="1200" y="2089"/>
-                  </a:lnTo>
-                  <a:lnTo>
-                    <a:pt x="5341" y="634"/>
-                  </a:lnTo>
-                  <a:close/>
-                  <a:moveTo>
-                    <a:pt x="7863" y="3279"/>
-                  </a:moveTo>
-                  <a:lnTo>
-                    <a:pt x="7863" y="5585"/>
-                  </a:lnTo>
-                  <a:lnTo>
-                    <a:pt x="5341" y="6569"/>
-                  </a:lnTo>
-                  <a:lnTo>
-                    <a:pt x="2778" y="5585"/>
-                  </a:lnTo>
-                  <a:lnTo>
-                    <a:pt x="2778" y="3279"/>
-                  </a:lnTo>
-                  <a:lnTo>
-                    <a:pt x="5208" y="4089"/>
-                  </a:lnTo>
-                  <a:cubicBezTo>
-                    <a:pt x="5259" y="4140"/>
-                    <a:pt x="5300" y="4140"/>
-                    <a:pt x="5341" y="4140"/>
-                  </a:cubicBezTo>
-                  <a:cubicBezTo>
-                    <a:pt x="5382" y="4140"/>
-                    <a:pt x="5382" y="4140"/>
-                    <a:pt x="5423" y="4089"/>
-                  </a:cubicBezTo>
-                  <a:lnTo>
-                    <a:pt x="7863" y="3279"/>
-                  </a:lnTo>
-                  <a:close/>
-                  <a:moveTo>
-                    <a:pt x="5335" y="1"/>
-                  </a:moveTo>
-                  <a:cubicBezTo>
-                    <a:pt x="5298" y="1"/>
-                    <a:pt x="5254" y="14"/>
-                    <a:pt x="5208" y="39"/>
-                  </a:cubicBezTo>
-                  <a:lnTo>
-                    <a:pt x="216" y="1782"/>
-                  </a:lnTo>
-                  <a:cubicBezTo>
-                    <a:pt x="82" y="1874"/>
-                    <a:pt x="0" y="1997"/>
-                    <a:pt x="0" y="2171"/>
-                  </a:cubicBezTo>
-                  <a:cubicBezTo>
-                    <a:pt x="41" y="2253"/>
-                    <a:pt x="133" y="2346"/>
-                    <a:pt x="216" y="2387"/>
-                  </a:cubicBezTo>
-                  <a:lnTo>
-                    <a:pt x="2184" y="3063"/>
-                  </a:lnTo>
-                  <a:lnTo>
-                    <a:pt x="2184" y="5800"/>
-                  </a:lnTo>
-                  <a:cubicBezTo>
-                    <a:pt x="2184" y="5934"/>
-                    <a:pt x="2266" y="6016"/>
-                    <a:pt x="2389" y="6057"/>
-                  </a:cubicBezTo>
-                  <a:lnTo>
-                    <a:pt x="5208" y="7164"/>
-                  </a:lnTo>
-                  <a:lnTo>
-                    <a:pt x="5423" y="7164"/>
-                  </a:lnTo>
-                  <a:lnTo>
-                    <a:pt x="8283" y="6057"/>
-                  </a:lnTo>
-                  <a:cubicBezTo>
-                    <a:pt x="8376" y="6016"/>
-                    <a:pt x="8458" y="5934"/>
-                    <a:pt x="8458" y="5800"/>
-                  </a:cubicBezTo>
-                  <a:lnTo>
-                    <a:pt x="8458" y="3063"/>
-                  </a:lnTo>
-                  <a:lnTo>
-                    <a:pt x="10426" y="2387"/>
-                  </a:lnTo>
-                  <a:cubicBezTo>
-                    <a:pt x="10549" y="2346"/>
-                    <a:pt x="10590" y="2253"/>
-                    <a:pt x="10641" y="2171"/>
-                  </a:cubicBezTo>
-                  <a:cubicBezTo>
-                    <a:pt x="10682" y="1997"/>
-                    <a:pt x="10590" y="1874"/>
-                    <a:pt x="10467" y="1782"/>
-                  </a:cubicBezTo>
-                  <a:lnTo>
-                    <a:pt x="5423" y="39"/>
-                  </a:lnTo>
-                  <a:cubicBezTo>
-                    <a:pt x="5403" y="14"/>
-                    <a:pt x="5372" y="1"/>
-                    <a:pt x="5335" y="1"/>
-                  </a:cubicBezTo>
-                  <a:close/>
-                </a:path>
-              </a:pathLst>
-            </a:custGeom>
-            <a:solidFill>
-              <a:srgbClr val="B2B2B2"/>
-            </a:solidFill>
-            <a:ln>
-              <a:noFill/>
-            </a:ln>
-          </p:spPr>
-          <p:txBody>
-            <a:bodyPr anchorCtr="0" anchor="ctr" bIns="91425" lIns="91425" spcFirstLastPara="1" rIns="91425" wrap="square" tIns="91425">
-              <a:noAutofit/>
-            </a:bodyPr>
-            <a:lstStyle/>
-            <a:p>
-              <a:pPr indent="0" lvl="0" marL="0" rtl="0" algn="l">
-                <a:spcBef>
-                  <a:spcPts val="0"/>
-                </a:spcBef>
-                <a:spcAft>
-                  <a:spcPts val="0"/>
-                </a:spcAft>
-                <a:buNone/>
-              </a:pPr>
-              <a:r>
-                <a:t/>
-              </a:r>
-              <a:endParaRPr/>
-            </a:p>
-          </p:txBody>
-        </p:sp>
-      </p:grpSp>
-      <p:grpSp>
-        <p:nvGrpSpPr>
-          <p:cNvPr id="391" name="Google Shape;391;p33"/>
+          <p:cNvPr id="374" name="Google Shape;374;p33"/>
           <p:cNvGrpSpPr/>
           <p:nvPr/>
         </p:nvGrpSpPr>
@@ -33255,7 +31709,7 @@
         </p:grpSpPr>
         <p:sp>
           <p:nvSpPr>
-            <p:cNvPr id="392" name="Google Shape;392;p33"/>
+            <p:cNvPr id="375" name="Google Shape;375;p33"/>
             <p:cNvSpPr/>
             <p:nvPr/>
           </p:nvSpPr>
@@ -33416,7 +31870,7 @@
         </p:sp>
         <p:sp>
           <p:nvSpPr>
-            <p:cNvPr id="393" name="Google Shape;393;p33"/>
+            <p:cNvPr id="376" name="Google Shape;376;p33"/>
             <p:cNvSpPr/>
             <p:nvPr/>
           </p:nvSpPr>
@@ -33509,7 +31963,7 @@
         </p:sp>
         <p:sp>
           <p:nvSpPr>
-            <p:cNvPr id="394" name="Google Shape;394;p33"/>
+            <p:cNvPr id="377" name="Google Shape;377;p33"/>
             <p:cNvSpPr/>
             <p:nvPr/>
           </p:nvSpPr>
@@ -33583,7 +32037,7 @@
         </p:sp>
         <p:sp>
           <p:nvSpPr>
-            <p:cNvPr id="395" name="Google Shape;395;p33"/>
+            <p:cNvPr id="378" name="Google Shape;378;p33"/>
             <p:cNvSpPr/>
             <p:nvPr/>
           </p:nvSpPr>
@@ -33657,7 +32111,7 @@
         </p:sp>
         <p:sp>
           <p:nvSpPr>
-            <p:cNvPr id="396" name="Google Shape;396;p33"/>
+            <p:cNvPr id="379" name="Google Shape;379;p33"/>
             <p:cNvSpPr/>
             <p:nvPr/>
           </p:nvSpPr>
@@ -33731,7 +32185,7 @@
         </p:sp>
         <p:sp>
           <p:nvSpPr>
-            <p:cNvPr id="397" name="Google Shape;397;p33"/>
+            <p:cNvPr id="380" name="Google Shape;380;p33"/>
             <p:cNvSpPr/>
             <p:nvPr/>
           </p:nvSpPr>
@@ -33805,7 +32259,7 @@
         </p:sp>
         <p:sp>
           <p:nvSpPr>
-            <p:cNvPr id="398" name="Google Shape;398;p33"/>
+            <p:cNvPr id="381" name="Google Shape;381;p33"/>
             <p:cNvSpPr/>
             <p:nvPr/>
           </p:nvSpPr>
@@ -33879,7 +32333,7 @@
         </p:sp>
         <p:sp>
           <p:nvSpPr>
-            <p:cNvPr id="399" name="Google Shape;399;p33"/>
+            <p:cNvPr id="382" name="Google Shape;382;p33"/>
             <p:cNvSpPr/>
             <p:nvPr/>
           </p:nvSpPr>
@@ -33953,7 +32407,7 @@
         </p:sp>
         <p:sp>
           <p:nvSpPr>
-            <p:cNvPr id="400" name="Google Shape;400;p33"/>
+            <p:cNvPr id="383" name="Google Shape;383;p33"/>
             <p:cNvSpPr/>
             <p:nvPr/>
           </p:nvSpPr>
@@ -34028,9 +32482,9 @@
       </p:grpSp>
       <p:cxnSp>
         <p:nvCxnSpPr>
-          <p:cNvPr id="401" name="Google Shape;401;p33"/>
+          <p:cNvPr id="384" name="Google Shape;384;p33"/>
           <p:cNvCxnSpPr>
-            <a:stCxn id="367" idx="2"/>
+            <a:stCxn id="366" idx="2"/>
           </p:cNvCxnSpPr>
           <p:nvPr/>
         </p:nvCxnSpPr>
@@ -34056,9 +32510,9 @@
       </p:cxnSp>
       <p:cxnSp>
         <p:nvCxnSpPr>
-          <p:cNvPr id="402" name="Google Shape;402;p33"/>
+          <p:cNvPr id="385" name="Google Shape;385;p33"/>
           <p:cNvCxnSpPr>
-            <a:stCxn id="366" idx="2"/>
+            <a:stCxn id="386" idx="2"/>
           </p:cNvCxnSpPr>
           <p:nvPr/>
         </p:nvCxnSpPr>
@@ -34084,7 +32538,7 @@
       </p:cxnSp>
       <p:cxnSp>
         <p:nvCxnSpPr>
-          <p:cNvPr id="403" name="Google Shape;403;p33"/>
+          <p:cNvPr id="387" name="Google Shape;387;p33"/>
           <p:cNvCxnSpPr>
             <a:stCxn id="365" idx="2"/>
           </p:cNvCxnSpPr>
@@ -34112,7 +32566,7 @@
       </p:cxnSp>
       <p:sp>
         <p:nvSpPr>
-          <p:cNvPr id="404" name="Google Shape;404;p33"/>
+          <p:cNvPr id="388" name="Google Shape;388;p33"/>
           <p:cNvSpPr txBox="1"/>
           <p:nvPr>
             <p:ph idx="12" type="sldNum"/>
@@ -34150,6 +32604,1839 @@
           </a:p>
         </p:txBody>
       </p:sp>
+      <p:grpSp>
+        <p:nvGrpSpPr>
+          <p:cNvPr id="389" name="Google Shape;389;p33"/>
+          <p:cNvGrpSpPr/>
+          <p:nvPr/>
+        </p:nvGrpSpPr>
+        <p:grpSpPr>
+          <a:xfrm>
+            <a:off x="2069913" y="2453663"/>
+            <a:ext cx="345000" cy="344725"/>
+            <a:chOff x="5551263" y="3074775"/>
+            <a:chExt cx="345000" cy="344725"/>
+          </a:xfrm>
+        </p:grpSpPr>
+        <p:sp>
+          <p:nvSpPr>
+            <p:cNvPr id="390" name="Google Shape;390;p33"/>
+            <p:cNvSpPr/>
+            <p:nvPr/>
+          </p:nvSpPr>
+          <p:spPr>
+            <a:xfrm>
+              <a:off x="5736063" y="3086300"/>
+              <a:ext cx="130200" cy="156875"/>
+            </a:xfrm>
+            <a:custGeom>
+              <a:rect b="b" l="l" r="r" t="t"/>
+              <a:pathLst>
+                <a:path extrusionOk="0" h="6275" w="5208">
+                  <a:moveTo>
+                    <a:pt x="1364" y="0"/>
+                  </a:moveTo>
+                  <a:lnTo>
+                    <a:pt x="421" y="1108"/>
+                  </a:lnTo>
+                  <a:cubicBezTo>
+                    <a:pt x="41" y="1497"/>
+                    <a:pt x="41" y="2133"/>
+                    <a:pt x="380" y="2563"/>
+                  </a:cubicBezTo>
+                  <a:lnTo>
+                    <a:pt x="421" y="2645"/>
+                  </a:lnTo>
+                  <a:cubicBezTo>
+                    <a:pt x="595" y="2820"/>
+                    <a:pt x="595" y="3076"/>
+                    <a:pt x="462" y="3240"/>
+                  </a:cubicBezTo>
+                  <a:lnTo>
+                    <a:pt x="298" y="3496"/>
+                  </a:lnTo>
+                  <a:cubicBezTo>
+                    <a:pt x="0" y="3927"/>
+                    <a:pt x="41" y="4521"/>
+                    <a:pt x="421" y="4911"/>
+                  </a:cubicBezTo>
+                  <a:lnTo>
+                    <a:pt x="769" y="5249"/>
+                  </a:lnTo>
+                  <a:cubicBezTo>
+                    <a:pt x="980" y="5460"/>
+                    <a:pt x="1247" y="5560"/>
+                    <a:pt x="1523" y="5560"/>
+                  </a:cubicBezTo>
+                  <a:cubicBezTo>
+                    <a:pt x="1583" y="5560"/>
+                    <a:pt x="1642" y="5555"/>
+                    <a:pt x="1702" y="5546"/>
+                  </a:cubicBezTo>
+                  <a:lnTo>
+                    <a:pt x="2819" y="5423"/>
+                  </a:lnTo>
+                  <a:cubicBezTo>
+                    <a:pt x="2983" y="5423"/>
+                    <a:pt x="3158" y="5505"/>
+                    <a:pt x="3281" y="5639"/>
+                  </a:cubicBezTo>
+                  <a:lnTo>
+                    <a:pt x="3414" y="5803"/>
+                  </a:lnTo>
+                  <a:cubicBezTo>
+                    <a:pt x="3629" y="6110"/>
+                    <a:pt x="3927" y="6274"/>
+                    <a:pt x="4306" y="6274"/>
+                  </a:cubicBezTo>
+                  <a:lnTo>
+                    <a:pt x="5208" y="6274"/>
+                  </a:lnTo>
+                  <a:lnTo>
+                    <a:pt x="5208" y="5680"/>
+                  </a:lnTo>
+                  <a:lnTo>
+                    <a:pt x="4306" y="5680"/>
+                  </a:lnTo>
+                  <a:cubicBezTo>
+                    <a:pt x="4142" y="5680"/>
+                    <a:pt x="3968" y="5598"/>
+                    <a:pt x="3886" y="5464"/>
+                  </a:cubicBezTo>
+                  <a:lnTo>
+                    <a:pt x="3752" y="5290"/>
+                  </a:lnTo>
+                  <a:cubicBezTo>
+                    <a:pt x="3522" y="5023"/>
+                    <a:pt x="3193" y="4864"/>
+                    <a:pt x="2846" y="4864"/>
+                  </a:cubicBezTo>
+                  <a:cubicBezTo>
+                    <a:pt x="2806" y="4864"/>
+                    <a:pt x="2767" y="4866"/>
+                    <a:pt x="2727" y="4870"/>
+                  </a:cubicBezTo>
+                  <a:lnTo>
+                    <a:pt x="1620" y="4993"/>
+                  </a:lnTo>
+                  <a:cubicBezTo>
+                    <a:pt x="1446" y="4993"/>
+                    <a:pt x="1323" y="4952"/>
+                    <a:pt x="1189" y="4829"/>
+                  </a:cubicBezTo>
+                  <a:lnTo>
+                    <a:pt x="851" y="4480"/>
+                  </a:lnTo>
+                  <a:cubicBezTo>
+                    <a:pt x="677" y="4316"/>
+                    <a:pt x="636" y="4009"/>
+                    <a:pt x="769" y="3845"/>
+                  </a:cubicBezTo>
+                  <a:lnTo>
+                    <a:pt x="933" y="3588"/>
+                  </a:lnTo>
+                  <a:cubicBezTo>
+                    <a:pt x="1230" y="3158"/>
+                    <a:pt x="1189" y="2645"/>
+                    <a:pt x="892" y="2266"/>
+                  </a:cubicBezTo>
+                  <a:lnTo>
+                    <a:pt x="851" y="2174"/>
+                  </a:lnTo>
+                  <a:cubicBezTo>
+                    <a:pt x="677" y="1958"/>
+                    <a:pt x="677" y="1702"/>
+                    <a:pt x="851" y="1497"/>
+                  </a:cubicBezTo>
+                  <a:lnTo>
+                    <a:pt x="1835" y="421"/>
+                  </a:lnTo>
+                  <a:lnTo>
+                    <a:pt x="1364" y="0"/>
+                  </a:lnTo>
+                  <a:close/>
+                </a:path>
+              </a:pathLst>
+            </a:custGeom>
+            <a:solidFill>
+              <a:srgbClr val="B2B2B2"/>
+            </a:solidFill>
+            <a:ln>
+              <a:noFill/>
+            </a:ln>
+          </p:spPr>
+          <p:txBody>
+            <a:bodyPr anchorCtr="0" anchor="ctr" bIns="91425" lIns="91425" spcFirstLastPara="1" rIns="91425" wrap="square" tIns="91425">
+              <a:noAutofit/>
+            </a:bodyPr>
+            <a:lstStyle/>
+            <a:p>
+              <a:pPr indent="0" lvl="0" marL="0" rtl="0" algn="l">
+                <a:spcBef>
+                  <a:spcPts val="0"/>
+                </a:spcBef>
+                <a:spcAft>
+                  <a:spcPts val="0"/>
+                </a:spcAft>
+                <a:buNone/>
+              </a:pPr>
+              <a:r>
+                <a:t/>
+              </a:r>
+              <a:endParaRPr/>
+            </a:p>
+          </p:txBody>
+        </p:sp>
+        <p:sp>
+          <p:nvSpPr>
+            <p:cNvPr id="391" name="Google Shape;391;p33"/>
+            <p:cNvSpPr/>
+            <p:nvPr/>
+          </p:nvSpPr>
+          <p:spPr>
+            <a:xfrm>
+              <a:off x="5583313" y="3105525"/>
+              <a:ext cx="102525" cy="153800"/>
+            </a:xfrm>
+            <a:custGeom>
+              <a:rect b="b" l="l" r="r" t="t"/>
+              <a:pathLst>
+                <a:path extrusionOk="0" h="6152" w="4101">
+                  <a:moveTo>
+                    <a:pt x="2389" y="0"/>
+                  </a:moveTo>
+                  <a:lnTo>
+                    <a:pt x="2010" y="421"/>
+                  </a:lnTo>
+                  <a:lnTo>
+                    <a:pt x="2902" y="1241"/>
+                  </a:lnTo>
+                  <a:cubicBezTo>
+                    <a:pt x="3117" y="1405"/>
+                    <a:pt x="3158" y="1702"/>
+                    <a:pt x="2984" y="1917"/>
+                  </a:cubicBezTo>
+                  <a:lnTo>
+                    <a:pt x="2943" y="2010"/>
+                  </a:lnTo>
+                  <a:cubicBezTo>
+                    <a:pt x="2604" y="2522"/>
+                    <a:pt x="2727" y="3158"/>
+                    <a:pt x="3158" y="3496"/>
+                  </a:cubicBezTo>
+                  <a:cubicBezTo>
+                    <a:pt x="3414" y="3711"/>
+                    <a:pt x="3414" y="3968"/>
+                    <a:pt x="3332" y="4142"/>
+                  </a:cubicBezTo>
+                  <a:lnTo>
+                    <a:pt x="2902" y="5085"/>
+                  </a:lnTo>
+                  <a:cubicBezTo>
+                    <a:pt x="2861" y="5249"/>
+                    <a:pt x="2686" y="5382"/>
+                    <a:pt x="2471" y="5382"/>
+                  </a:cubicBezTo>
+                  <a:lnTo>
+                    <a:pt x="0" y="5546"/>
+                  </a:lnTo>
+                  <a:lnTo>
+                    <a:pt x="0" y="6151"/>
+                  </a:lnTo>
+                  <a:lnTo>
+                    <a:pt x="2522" y="5977"/>
+                  </a:lnTo>
+                  <a:cubicBezTo>
+                    <a:pt x="2943" y="5936"/>
+                    <a:pt x="3291" y="5680"/>
+                    <a:pt x="3455" y="5290"/>
+                  </a:cubicBezTo>
+                  <a:lnTo>
+                    <a:pt x="3886" y="4398"/>
+                  </a:lnTo>
+                  <a:cubicBezTo>
+                    <a:pt x="4101" y="3927"/>
+                    <a:pt x="3968" y="3373"/>
+                    <a:pt x="3547" y="3035"/>
+                  </a:cubicBezTo>
+                  <a:cubicBezTo>
+                    <a:pt x="3332" y="2860"/>
+                    <a:pt x="3291" y="2563"/>
+                    <a:pt x="3414" y="2348"/>
+                  </a:cubicBezTo>
+                  <a:lnTo>
+                    <a:pt x="3496" y="2266"/>
+                  </a:lnTo>
+                  <a:cubicBezTo>
+                    <a:pt x="3804" y="1794"/>
+                    <a:pt x="3711" y="1148"/>
+                    <a:pt x="3332" y="810"/>
+                  </a:cubicBezTo>
+                  <a:lnTo>
+                    <a:pt x="2389" y="0"/>
+                  </a:lnTo>
+                  <a:close/>
+                </a:path>
+              </a:pathLst>
+            </a:custGeom>
+            <a:solidFill>
+              <a:srgbClr val="B2B2B2"/>
+            </a:solidFill>
+            <a:ln>
+              <a:noFill/>
+            </a:ln>
+          </p:spPr>
+          <p:txBody>
+            <a:bodyPr anchorCtr="0" anchor="ctr" bIns="91425" lIns="91425" spcFirstLastPara="1" rIns="91425" wrap="square" tIns="91425">
+              <a:noAutofit/>
+            </a:bodyPr>
+            <a:lstStyle/>
+            <a:p>
+              <a:pPr indent="0" lvl="0" marL="0" rtl="0" algn="l">
+                <a:spcBef>
+                  <a:spcPts val="0"/>
+                </a:spcBef>
+                <a:spcAft>
+                  <a:spcPts val="0"/>
+                </a:spcAft>
+                <a:buNone/>
+              </a:pPr>
+              <a:r>
+                <a:t/>
+              </a:r>
+              <a:endParaRPr/>
+            </a:p>
+          </p:txBody>
+        </p:sp>
+        <p:sp>
+          <p:nvSpPr>
+            <p:cNvPr id="392" name="Google Shape;392;p33"/>
+            <p:cNvSpPr/>
+            <p:nvPr/>
+          </p:nvSpPr>
+          <p:spPr>
+            <a:xfrm>
+              <a:off x="5551263" y="3074775"/>
+              <a:ext cx="345000" cy="344725"/>
+            </a:xfrm>
+            <a:custGeom>
+              <a:rect b="b" l="l" r="r" t="t"/>
+              <a:pathLst>
+                <a:path extrusionOk="0" h="13789" w="13800">
+                  <a:moveTo>
+                    <a:pt x="6921" y="584"/>
+                  </a:moveTo>
+                  <a:cubicBezTo>
+                    <a:pt x="9863" y="584"/>
+                    <a:pt x="12303" y="3024"/>
+                    <a:pt x="12303" y="6007"/>
+                  </a:cubicBezTo>
+                  <a:cubicBezTo>
+                    <a:pt x="12303" y="6910"/>
+                    <a:pt x="12087" y="7760"/>
+                    <a:pt x="11698" y="8529"/>
+                  </a:cubicBezTo>
+                  <a:cubicBezTo>
+                    <a:pt x="10847" y="8488"/>
+                    <a:pt x="9996" y="8314"/>
+                    <a:pt x="9227" y="8058"/>
+                  </a:cubicBezTo>
+                  <a:cubicBezTo>
+                    <a:pt x="9186" y="8058"/>
+                    <a:pt x="9135" y="8058"/>
+                    <a:pt x="9135" y="8017"/>
+                  </a:cubicBezTo>
+                  <a:cubicBezTo>
+                    <a:pt x="8879" y="7976"/>
+                    <a:pt x="8715" y="7894"/>
+                    <a:pt x="8417" y="7894"/>
+                  </a:cubicBezTo>
+                  <a:cubicBezTo>
+                    <a:pt x="7772" y="7894"/>
+                    <a:pt x="7218" y="8232"/>
+                    <a:pt x="6921" y="8704"/>
+                  </a:cubicBezTo>
+                  <a:cubicBezTo>
+                    <a:pt x="6572" y="8232"/>
+                    <a:pt x="6019" y="7894"/>
+                    <a:pt x="5383" y="7894"/>
+                  </a:cubicBezTo>
+                  <a:cubicBezTo>
+                    <a:pt x="5086" y="7894"/>
+                    <a:pt x="4911" y="7976"/>
+                    <a:pt x="4655" y="8017"/>
+                  </a:cubicBezTo>
+                  <a:cubicBezTo>
+                    <a:pt x="4655" y="8058"/>
+                    <a:pt x="4614" y="8058"/>
+                    <a:pt x="4614" y="8058"/>
+                  </a:cubicBezTo>
+                  <a:cubicBezTo>
+                    <a:pt x="3804" y="8314"/>
+                    <a:pt x="2943" y="8488"/>
+                    <a:pt x="2092" y="8529"/>
+                  </a:cubicBezTo>
+                  <a:cubicBezTo>
+                    <a:pt x="1703" y="7760"/>
+                    <a:pt x="1498" y="6910"/>
+                    <a:pt x="1498" y="6007"/>
+                  </a:cubicBezTo>
+                  <a:cubicBezTo>
+                    <a:pt x="1498" y="3024"/>
+                    <a:pt x="3927" y="584"/>
+                    <a:pt x="6921" y="584"/>
+                  </a:cubicBezTo>
+                  <a:close/>
+                  <a:moveTo>
+                    <a:pt x="5424" y="8488"/>
+                  </a:moveTo>
+                  <a:cubicBezTo>
+                    <a:pt x="6060" y="8488"/>
+                    <a:pt x="6623" y="9042"/>
+                    <a:pt x="6623" y="9688"/>
+                  </a:cubicBezTo>
+                  <a:lnTo>
+                    <a:pt x="6623" y="10672"/>
+                  </a:lnTo>
+                  <a:cubicBezTo>
+                    <a:pt x="6234" y="10416"/>
+                    <a:pt x="5762" y="10323"/>
+                    <a:pt x="5291" y="10323"/>
+                  </a:cubicBezTo>
+                  <a:lnTo>
+                    <a:pt x="1067" y="10323"/>
+                  </a:lnTo>
+                  <a:lnTo>
+                    <a:pt x="1067" y="9688"/>
+                  </a:lnTo>
+                  <a:cubicBezTo>
+                    <a:pt x="1067" y="9390"/>
+                    <a:pt x="1282" y="9134"/>
+                    <a:pt x="1580" y="9134"/>
+                  </a:cubicBezTo>
+                  <a:cubicBezTo>
+                    <a:pt x="2687" y="9134"/>
+                    <a:pt x="3753" y="8960"/>
+                    <a:pt x="4778" y="8622"/>
+                  </a:cubicBezTo>
+                  <a:lnTo>
+                    <a:pt x="4870" y="8622"/>
+                  </a:lnTo>
+                  <a:cubicBezTo>
+                    <a:pt x="5086" y="8529"/>
+                    <a:pt x="5209" y="8488"/>
+                    <a:pt x="5424" y="8488"/>
+                  </a:cubicBezTo>
+                  <a:close/>
+                  <a:moveTo>
+                    <a:pt x="8366" y="8488"/>
+                  </a:moveTo>
+                  <a:cubicBezTo>
+                    <a:pt x="8581" y="8488"/>
+                    <a:pt x="8715" y="8529"/>
+                    <a:pt x="8930" y="8622"/>
+                  </a:cubicBezTo>
+                  <a:lnTo>
+                    <a:pt x="9012" y="8622"/>
+                  </a:lnTo>
+                  <a:cubicBezTo>
+                    <a:pt x="10037" y="8960"/>
+                    <a:pt x="11103" y="9134"/>
+                    <a:pt x="12210" y="9134"/>
+                  </a:cubicBezTo>
+                  <a:cubicBezTo>
+                    <a:pt x="12518" y="9134"/>
+                    <a:pt x="12723" y="9390"/>
+                    <a:pt x="12723" y="9688"/>
+                  </a:cubicBezTo>
+                  <a:lnTo>
+                    <a:pt x="12723" y="10323"/>
+                  </a:lnTo>
+                  <a:lnTo>
+                    <a:pt x="8499" y="10323"/>
+                  </a:lnTo>
+                  <a:cubicBezTo>
+                    <a:pt x="8028" y="10323"/>
+                    <a:pt x="7597" y="10416"/>
+                    <a:pt x="7177" y="10672"/>
+                  </a:cubicBezTo>
+                  <a:lnTo>
+                    <a:pt x="7177" y="9688"/>
+                  </a:lnTo>
+                  <a:cubicBezTo>
+                    <a:pt x="7177" y="9042"/>
+                    <a:pt x="7731" y="8488"/>
+                    <a:pt x="8366" y="8488"/>
+                  </a:cubicBezTo>
+                  <a:close/>
+                  <a:moveTo>
+                    <a:pt x="13195" y="10877"/>
+                  </a:moveTo>
+                  <a:lnTo>
+                    <a:pt x="13195" y="12035"/>
+                  </a:lnTo>
+                  <a:lnTo>
+                    <a:pt x="8243" y="12035"/>
+                  </a:lnTo>
+                  <a:cubicBezTo>
+                    <a:pt x="7946" y="12035"/>
+                    <a:pt x="7690" y="12251"/>
+                    <a:pt x="7649" y="12548"/>
+                  </a:cubicBezTo>
+                  <a:cubicBezTo>
+                    <a:pt x="7597" y="12927"/>
+                    <a:pt x="7259" y="13183"/>
+                    <a:pt x="6921" y="13183"/>
+                  </a:cubicBezTo>
+                  <a:cubicBezTo>
+                    <a:pt x="6531" y="13183"/>
+                    <a:pt x="6234" y="12927"/>
+                    <a:pt x="6152" y="12548"/>
+                  </a:cubicBezTo>
+                  <a:cubicBezTo>
+                    <a:pt x="6111" y="12251"/>
+                    <a:pt x="5855" y="12035"/>
+                    <a:pt x="5547" y="12035"/>
+                  </a:cubicBezTo>
+                  <a:lnTo>
+                    <a:pt x="596" y="12035"/>
+                  </a:lnTo>
+                  <a:lnTo>
+                    <a:pt x="596" y="10877"/>
+                  </a:lnTo>
+                  <a:lnTo>
+                    <a:pt x="5291" y="10877"/>
+                  </a:lnTo>
+                  <a:cubicBezTo>
+                    <a:pt x="5803" y="10877"/>
+                    <a:pt x="6316" y="11092"/>
+                    <a:pt x="6705" y="11482"/>
+                  </a:cubicBezTo>
+                  <a:cubicBezTo>
+                    <a:pt x="6746" y="11523"/>
+                    <a:pt x="6821" y="11543"/>
+                    <a:pt x="6901" y="11543"/>
+                  </a:cubicBezTo>
+                  <a:cubicBezTo>
+                    <a:pt x="6982" y="11543"/>
+                    <a:pt x="7069" y="11523"/>
+                    <a:pt x="7136" y="11482"/>
+                  </a:cubicBezTo>
+                  <a:cubicBezTo>
+                    <a:pt x="7474" y="11092"/>
+                    <a:pt x="7987" y="10877"/>
+                    <a:pt x="8499" y="10877"/>
+                  </a:cubicBezTo>
+                  <a:close/>
+                  <a:moveTo>
+                    <a:pt x="6914" y="0"/>
+                  </a:moveTo>
+                  <a:cubicBezTo>
+                    <a:pt x="5301" y="0"/>
+                    <a:pt x="3789" y="634"/>
+                    <a:pt x="2646" y="1743"/>
+                  </a:cubicBezTo>
+                  <a:cubicBezTo>
+                    <a:pt x="1498" y="2891"/>
+                    <a:pt x="893" y="4388"/>
+                    <a:pt x="893" y="6007"/>
+                  </a:cubicBezTo>
+                  <a:cubicBezTo>
+                    <a:pt x="893" y="6910"/>
+                    <a:pt x="1067" y="7760"/>
+                    <a:pt x="1446" y="8570"/>
+                  </a:cubicBezTo>
+                  <a:cubicBezTo>
+                    <a:pt x="893" y="8622"/>
+                    <a:pt x="472" y="9083"/>
+                    <a:pt x="472" y="9688"/>
+                  </a:cubicBezTo>
+                  <a:lnTo>
+                    <a:pt x="472" y="10323"/>
+                  </a:lnTo>
+                  <a:lnTo>
+                    <a:pt x="298" y="10323"/>
+                  </a:lnTo>
+                  <a:cubicBezTo>
+                    <a:pt x="124" y="10323"/>
+                    <a:pt x="1" y="10457"/>
+                    <a:pt x="1" y="10580"/>
+                  </a:cubicBezTo>
+                  <a:lnTo>
+                    <a:pt x="1" y="12333"/>
+                  </a:lnTo>
+                  <a:cubicBezTo>
+                    <a:pt x="1" y="12507"/>
+                    <a:pt x="124" y="12630"/>
+                    <a:pt x="298" y="12630"/>
+                  </a:cubicBezTo>
+                  <a:lnTo>
+                    <a:pt x="5547" y="12630"/>
+                  </a:lnTo>
+                  <a:lnTo>
+                    <a:pt x="5547" y="12671"/>
+                  </a:lnTo>
+                  <a:cubicBezTo>
+                    <a:pt x="5680" y="13317"/>
+                    <a:pt x="6234" y="13788"/>
+                    <a:pt x="6921" y="13788"/>
+                  </a:cubicBezTo>
+                  <a:cubicBezTo>
+                    <a:pt x="7556" y="13788"/>
+                    <a:pt x="8110" y="13317"/>
+                    <a:pt x="8243" y="12671"/>
+                  </a:cubicBezTo>
+                  <a:lnTo>
+                    <a:pt x="8243" y="12630"/>
+                  </a:lnTo>
+                  <a:lnTo>
+                    <a:pt x="13492" y="12630"/>
+                  </a:lnTo>
+                  <a:cubicBezTo>
+                    <a:pt x="13666" y="12630"/>
+                    <a:pt x="13799" y="12507"/>
+                    <a:pt x="13799" y="12333"/>
+                  </a:cubicBezTo>
+                  <a:lnTo>
+                    <a:pt x="13799" y="10580"/>
+                  </a:lnTo>
+                  <a:cubicBezTo>
+                    <a:pt x="13799" y="10457"/>
+                    <a:pt x="13666" y="10323"/>
+                    <a:pt x="13492" y="10323"/>
+                  </a:cubicBezTo>
+                  <a:lnTo>
+                    <a:pt x="13287" y="10323"/>
+                  </a:lnTo>
+                  <a:lnTo>
+                    <a:pt x="13287" y="9688"/>
+                  </a:lnTo>
+                  <a:cubicBezTo>
+                    <a:pt x="13287" y="9083"/>
+                    <a:pt x="12856" y="8622"/>
+                    <a:pt x="12303" y="8570"/>
+                  </a:cubicBezTo>
+                  <a:cubicBezTo>
+                    <a:pt x="12682" y="7760"/>
+                    <a:pt x="12897" y="6910"/>
+                    <a:pt x="12897" y="6007"/>
+                  </a:cubicBezTo>
+                  <a:cubicBezTo>
+                    <a:pt x="12897" y="4090"/>
+                    <a:pt x="12005" y="2296"/>
+                    <a:pt x="10416" y="1138"/>
+                  </a:cubicBezTo>
+                  <a:cubicBezTo>
+                    <a:pt x="9648" y="584"/>
+                    <a:pt x="8756" y="205"/>
+                    <a:pt x="7854" y="72"/>
+                  </a:cubicBezTo>
+                  <a:cubicBezTo>
+                    <a:pt x="7538" y="24"/>
+                    <a:pt x="7224" y="0"/>
+                    <a:pt x="6914" y="0"/>
+                  </a:cubicBezTo>
+                  <a:close/>
+                </a:path>
+              </a:pathLst>
+            </a:custGeom>
+            <a:solidFill>
+              <a:srgbClr val="333333"/>
+            </a:solidFill>
+            <a:ln>
+              <a:noFill/>
+            </a:ln>
+          </p:spPr>
+          <p:txBody>
+            <a:bodyPr anchorCtr="0" anchor="ctr" bIns="91425" lIns="91425" spcFirstLastPara="1" rIns="91425" wrap="square" tIns="91425">
+              <a:noAutofit/>
+            </a:bodyPr>
+            <a:lstStyle/>
+            <a:p>
+              <a:pPr indent="0" lvl="0" marL="0" rtl="0" algn="l">
+                <a:spcBef>
+                  <a:spcPts val="0"/>
+                </a:spcBef>
+                <a:spcAft>
+                  <a:spcPts val="0"/>
+                </a:spcAft>
+                <a:buNone/>
+              </a:pPr>
+              <a:r>
+                <a:t/>
+              </a:r>
+              <a:endParaRPr/>
+            </a:p>
+          </p:txBody>
+        </p:sp>
+      </p:grpSp>
+      <p:grpSp>
+        <p:nvGrpSpPr>
+          <p:cNvPr id="393" name="Google Shape;393;p33"/>
+          <p:cNvGrpSpPr/>
+          <p:nvPr/>
+        </p:nvGrpSpPr>
+        <p:grpSpPr>
+          <a:xfrm>
+            <a:off x="1460325" y="1301163"/>
+            <a:ext cx="344975" cy="332425"/>
+            <a:chOff x="3266988" y="3080650"/>
+            <a:chExt cx="344975" cy="332425"/>
+          </a:xfrm>
+        </p:grpSpPr>
+        <p:sp>
+          <p:nvSpPr>
+            <p:cNvPr id="394" name="Google Shape;394;p33"/>
+            <p:cNvSpPr/>
+            <p:nvPr/>
+          </p:nvSpPr>
+          <p:spPr>
+            <a:xfrm>
+              <a:off x="3266988" y="3267750"/>
+              <a:ext cx="344975" cy="145325"/>
+            </a:xfrm>
+            <a:custGeom>
+              <a:rect b="b" l="l" r="r" t="t"/>
+              <a:pathLst>
+                <a:path extrusionOk="0" h="5813" w="13799">
+                  <a:moveTo>
+                    <a:pt x="5475" y="554"/>
+                  </a:moveTo>
+                  <a:cubicBezTo>
+                    <a:pt x="6110" y="595"/>
+                    <a:pt x="6623" y="1108"/>
+                    <a:pt x="6623" y="1794"/>
+                  </a:cubicBezTo>
+                  <a:lnTo>
+                    <a:pt x="6623" y="2738"/>
+                  </a:lnTo>
+                  <a:cubicBezTo>
+                    <a:pt x="6244" y="2522"/>
+                    <a:pt x="5813" y="2389"/>
+                    <a:pt x="5341" y="2389"/>
+                  </a:cubicBezTo>
+                  <a:lnTo>
+                    <a:pt x="1118" y="2389"/>
+                  </a:lnTo>
+                  <a:lnTo>
+                    <a:pt x="1118" y="1753"/>
+                  </a:lnTo>
+                  <a:cubicBezTo>
+                    <a:pt x="1118" y="1456"/>
+                    <a:pt x="1323" y="1241"/>
+                    <a:pt x="1630" y="1241"/>
+                  </a:cubicBezTo>
+                  <a:cubicBezTo>
+                    <a:pt x="2697" y="1241"/>
+                    <a:pt x="3804" y="1067"/>
+                    <a:pt x="4829" y="728"/>
+                  </a:cubicBezTo>
+                  <a:cubicBezTo>
+                    <a:pt x="4829" y="687"/>
+                    <a:pt x="4870" y="687"/>
+                    <a:pt x="4911" y="687"/>
+                  </a:cubicBezTo>
+                  <a:cubicBezTo>
+                    <a:pt x="5126" y="595"/>
+                    <a:pt x="5259" y="554"/>
+                    <a:pt x="5475" y="554"/>
+                  </a:cubicBezTo>
+                  <a:close/>
+                  <a:moveTo>
+                    <a:pt x="8417" y="554"/>
+                  </a:moveTo>
+                  <a:cubicBezTo>
+                    <a:pt x="8632" y="554"/>
+                    <a:pt x="8755" y="595"/>
+                    <a:pt x="8929" y="687"/>
+                  </a:cubicBezTo>
+                  <a:cubicBezTo>
+                    <a:pt x="8970" y="687"/>
+                    <a:pt x="9011" y="687"/>
+                    <a:pt x="9011" y="728"/>
+                  </a:cubicBezTo>
+                  <a:cubicBezTo>
+                    <a:pt x="10037" y="1067"/>
+                    <a:pt x="11154" y="1241"/>
+                    <a:pt x="12220" y="1241"/>
+                  </a:cubicBezTo>
+                  <a:cubicBezTo>
+                    <a:pt x="12517" y="1241"/>
+                    <a:pt x="12733" y="1456"/>
+                    <a:pt x="12733" y="1753"/>
+                  </a:cubicBezTo>
+                  <a:lnTo>
+                    <a:pt x="12733" y="2389"/>
+                  </a:lnTo>
+                  <a:lnTo>
+                    <a:pt x="8499" y="2389"/>
+                  </a:lnTo>
+                  <a:cubicBezTo>
+                    <a:pt x="8038" y="2389"/>
+                    <a:pt x="7607" y="2522"/>
+                    <a:pt x="7217" y="2738"/>
+                  </a:cubicBezTo>
+                  <a:lnTo>
+                    <a:pt x="7217" y="1794"/>
+                  </a:lnTo>
+                  <a:cubicBezTo>
+                    <a:pt x="7217" y="1108"/>
+                    <a:pt x="7730" y="554"/>
+                    <a:pt x="8417" y="554"/>
+                  </a:cubicBezTo>
+                  <a:close/>
+                  <a:moveTo>
+                    <a:pt x="13204" y="2994"/>
+                  </a:moveTo>
+                  <a:lnTo>
+                    <a:pt x="13204" y="4142"/>
+                  </a:lnTo>
+                  <a:lnTo>
+                    <a:pt x="8243" y="4142"/>
+                  </a:lnTo>
+                  <a:cubicBezTo>
+                    <a:pt x="7945" y="4142"/>
+                    <a:pt x="7730" y="4316"/>
+                    <a:pt x="7648" y="4614"/>
+                  </a:cubicBezTo>
+                  <a:cubicBezTo>
+                    <a:pt x="7607" y="4952"/>
+                    <a:pt x="7269" y="5208"/>
+                    <a:pt x="6920" y="5208"/>
+                  </a:cubicBezTo>
+                  <a:cubicBezTo>
+                    <a:pt x="6541" y="5208"/>
+                    <a:pt x="6244" y="4952"/>
+                    <a:pt x="6151" y="4614"/>
+                  </a:cubicBezTo>
+                  <a:cubicBezTo>
+                    <a:pt x="6110" y="4316"/>
+                    <a:pt x="5854" y="4142"/>
+                    <a:pt x="5557" y="4142"/>
+                  </a:cubicBezTo>
+                  <a:lnTo>
+                    <a:pt x="605" y="4142"/>
+                  </a:lnTo>
+                  <a:lnTo>
+                    <a:pt x="605" y="2994"/>
+                  </a:lnTo>
+                  <a:lnTo>
+                    <a:pt x="5300" y="2994"/>
+                  </a:lnTo>
+                  <a:cubicBezTo>
+                    <a:pt x="5813" y="2994"/>
+                    <a:pt x="6326" y="3158"/>
+                    <a:pt x="6705" y="3547"/>
+                  </a:cubicBezTo>
+                  <a:cubicBezTo>
+                    <a:pt x="6756" y="3588"/>
+                    <a:pt x="6838" y="3629"/>
+                    <a:pt x="6920" y="3629"/>
+                  </a:cubicBezTo>
+                  <a:cubicBezTo>
+                    <a:pt x="7012" y="3629"/>
+                    <a:pt x="7053" y="3588"/>
+                    <a:pt x="7135" y="3547"/>
+                  </a:cubicBezTo>
+                  <a:cubicBezTo>
+                    <a:pt x="7474" y="3158"/>
+                    <a:pt x="7986" y="2994"/>
+                    <a:pt x="8499" y="2994"/>
+                  </a:cubicBezTo>
+                  <a:close/>
+                  <a:moveTo>
+                    <a:pt x="5423" y="0"/>
+                  </a:moveTo>
+                  <a:cubicBezTo>
+                    <a:pt x="5126" y="0"/>
+                    <a:pt x="4911" y="41"/>
+                    <a:pt x="4706" y="134"/>
+                  </a:cubicBezTo>
+                  <a:cubicBezTo>
+                    <a:pt x="4655" y="134"/>
+                    <a:pt x="4655" y="134"/>
+                    <a:pt x="4614" y="175"/>
+                  </a:cubicBezTo>
+                  <a:cubicBezTo>
+                    <a:pt x="3629" y="472"/>
+                    <a:pt x="2656" y="646"/>
+                    <a:pt x="1630" y="646"/>
+                  </a:cubicBezTo>
+                  <a:cubicBezTo>
+                    <a:pt x="1026" y="646"/>
+                    <a:pt x="513" y="1159"/>
+                    <a:pt x="513" y="1753"/>
+                  </a:cubicBezTo>
+                  <a:lnTo>
+                    <a:pt x="513" y="2389"/>
+                  </a:lnTo>
+                  <a:lnTo>
+                    <a:pt x="298" y="2389"/>
+                  </a:lnTo>
+                  <a:cubicBezTo>
+                    <a:pt x="175" y="2389"/>
+                    <a:pt x="0" y="2522"/>
+                    <a:pt x="0" y="2697"/>
+                  </a:cubicBezTo>
+                  <a:lnTo>
+                    <a:pt x="0" y="4439"/>
+                  </a:lnTo>
+                  <a:cubicBezTo>
+                    <a:pt x="0" y="4614"/>
+                    <a:pt x="175" y="4747"/>
+                    <a:pt x="298" y="4747"/>
+                  </a:cubicBezTo>
+                  <a:lnTo>
+                    <a:pt x="5557" y="4747"/>
+                  </a:lnTo>
+                  <a:cubicBezTo>
+                    <a:pt x="5680" y="5341"/>
+                    <a:pt x="6285" y="5813"/>
+                    <a:pt x="6920" y="5813"/>
+                  </a:cubicBezTo>
+                  <a:cubicBezTo>
+                    <a:pt x="7566" y="5813"/>
+                    <a:pt x="8120" y="5341"/>
+                    <a:pt x="8243" y="4747"/>
+                  </a:cubicBezTo>
+                  <a:lnTo>
+                    <a:pt x="13502" y="4747"/>
+                  </a:lnTo>
+                  <a:cubicBezTo>
+                    <a:pt x="13676" y="4747"/>
+                    <a:pt x="13799" y="4614"/>
+                    <a:pt x="13799" y="4439"/>
+                  </a:cubicBezTo>
+                  <a:lnTo>
+                    <a:pt x="13799" y="2697"/>
+                  </a:lnTo>
+                  <a:cubicBezTo>
+                    <a:pt x="13799" y="2522"/>
+                    <a:pt x="13676" y="2389"/>
+                    <a:pt x="13502" y="2389"/>
+                  </a:cubicBezTo>
+                  <a:lnTo>
+                    <a:pt x="13327" y="2389"/>
+                  </a:lnTo>
+                  <a:lnTo>
+                    <a:pt x="13327" y="1753"/>
+                  </a:lnTo>
+                  <a:cubicBezTo>
+                    <a:pt x="13327" y="1159"/>
+                    <a:pt x="12815" y="646"/>
+                    <a:pt x="12220" y="646"/>
+                  </a:cubicBezTo>
+                  <a:cubicBezTo>
+                    <a:pt x="11195" y="646"/>
+                    <a:pt x="10211" y="472"/>
+                    <a:pt x="9227" y="175"/>
+                  </a:cubicBezTo>
+                  <a:cubicBezTo>
+                    <a:pt x="9186" y="134"/>
+                    <a:pt x="9186" y="134"/>
+                    <a:pt x="9145" y="134"/>
+                  </a:cubicBezTo>
+                  <a:cubicBezTo>
+                    <a:pt x="8929" y="41"/>
+                    <a:pt x="8714" y="0"/>
+                    <a:pt x="8417" y="0"/>
+                  </a:cubicBezTo>
+                  <a:cubicBezTo>
+                    <a:pt x="7781" y="0"/>
+                    <a:pt x="7269" y="298"/>
+                    <a:pt x="6920" y="810"/>
+                  </a:cubicBezTo>
+                  <a:cubicBezTo>
+                    <a:pt x="6582" y="298"/>
+                    <a:pt x="6028" y="0"/>
+                    <a:pt x="5423" y="0"/>
+                  </a:cubicBezTo>
+                  <a:close/>
+                </a:path>
+              </a:pathLst>
+            </a:custGeom>
+            <a:solidFill>
+              <a:srgbClr val="333333"/>
+            </a:solidFill>
+            <a:ln>
+              <a:noFill/>
+            </a:ln>
+          </p:spPr>
+          <p:txBody>
+            <a:bodyPr anchorCtr="0" anchor="ctr" bIns="91425" lIns="91425" spcFirstLastPara="1" rIns="91425" wrap="square" tIns="91425">
+              <a:noAutofit/>
+            </a:bodyPr>
+            <a:lstStyle/>
+            <a:p>
+              <a:pPr indent="0" lvl="0" marL="0" rtl="0" algn="l">
+                <a:spcBef>
+                  <a:spcPts val="0"/>
+                </a:spcBef>
+                <a:spcAft>
+                  <a:spcPts val="0"/>
+                </a:spcAft>
+                <a:buNone/>
+              </a:pPr>
+              <a:r>
+                <a:t/>
+              </a:r>
+              <a:endParaRPr/>
+            </a:p>
+          </p:txBody>
+        </p:sp>
+        <p:sp>
+          <p:nvSpPr>
+            <p:cNvPr id="395" name="Google Shape;395;p33"/>
+            <p:cNvSpPr/>
+            <p:nvPr/>
+          </p:nvSpPr>
+          <p:spPr>
+            <a:xfrm>
+              <a:off x="3361038" y="3173550"/>
+              <a:ext cx="59750" cy="59100"/>
+            </a:xfrm>
+            <a:custGeom>
+              <a:rect b="b" l="l" r="r" t="t"/>
+              <a:pathLst>
+                <a:path extrusionOk="0" h="2364" w="2390">
+                  <a:moveTo>
+                    <a:pt x="1189" y="0"/>
+                  </a:moveTo>
+                  <a:cubicBezTo>
+                    <a:pt x="1034" y="0"/>
+                    <a:pt x="893" y="157"/>
+                    <a:pt x="893" y="314"/>
+                  </a:cubicBezTo>
+                  <a:lnTo>
+                    <a:pt x="893" y="867"/>
+                  </a:lnTo>
+                  <a:lnTo>
+                    <a:pt x="298" y="867"/>
+                  </a:lnTo>
+                  <a:cubicBezTo>
+                    <a:pt x="175" y="867"/>
+                    <a:pt x="42" y="990"/>
+                    <a:pt x="1" y="1124"/>
+                  </a:cubicBezTo>
+                  <a:cubicBezTo>
+                    <a:pt x="1" y="1339"/>
+                    <a:pt x="124" y="1462"/>
+                    <a:pt x="298" y="1462"/>
+                  </a:cubicBezTo>
+                  <a:lnTo>
+                    <a:pt x="893" y="1462"/>
+                  </a:lnTo>
+                  <a:lnTo>
+                    <a:pt x="893" y="2056"/>
+                  </a:lnTo>
+                  <a:cubicBezTo>
+                    <a:pt x="893" y="2190"/>
+                    <a:pt x="985" y="2313"/>
+                    <a:pt x="1149" y="2364"/>
+                  </a:cubicBezTo>
+                  <a:cubicBezTo>
+                    <a:pt x="1323" y="2364"/>
+                    <a:pt x="1497" y="2231"/>
+                    <a:pt x="1497" y="2056"/>
+                  </a:cubicBezTo>
+                  <a:lnTo>
+                    <a:pt x="1497" y="1462"/>
+                  </a:lnTo>
+                  <a:lnTo>
+                    <a:pt x="2051" y="1462"/>
+                  </a:lnTo>
+                  <a:cubicBezTo>
+                    <a:pt x="2225" y="1462"/>
+                    <a:pt x="2389" y="1339"/>
+                    <a:pt x="2348" y="1124"/>
+                  </a:cubicBezTo>
+                  <a:cubicBezTo>
+                    <a:pt x="2307" y="990"/>
+                    <a:pt x="2174" y="867"/>
+                    <a:pt x="2051" y="867"/>
+                  </a:cubicBezTo>
+                  <a:lnTo>
+                    <a:pt x="1497" y="867"/>
+                  </a:lnTo>
+                  <a:lnTo>
+                    <a:pt x="1497" y="314"/>
+                  </a:lnTo>
+                  <a:cubicBezTo>
+                    <a:pt x="1497" y="180"/>
+                    <a:pt x="1364" y="57"/>
+                    <a:pt x="1241" y="6"/>
+                  </a:cubicBezTo>
+                  <a:cubicBezTo>
+                    <a:pt x="1224" y="2"/>
+                    <a:pt x="1206" y="0"/>
+                    <a:pt x="1189" y="0"/>
+                  </a:cubicBezTo>
+                  <a:close/>
+                </a:path>
+              </a:pathLst>
+            </a:custGeom>
+            <a:solidFill>
+              <a:srgbClr val="B2B2B2"/>
+            </a:solidFill>
+            <a:ln>
+              <a:noFill/>
+            </a:ln>
+          </p:spPr>
+          <p:txBody>
+            <a:bodyPr anchorCtr="0" anchor="ctr" bIns="91425" lIns="91425" spcFirstLastPara="1" rIns="91425" wrap="square" tIns="91425">
+              <a:noAutofit/>
+            </a:bodyPr>
+            <a:lstStyle/>
+            <a:p>
+              <a:pPr indent="0" lvl="0" marL="0" rtl="0" algn="l">
+                <a:spcBef>
+                  <a:spcPts val="0"/>
+                </a:spcBef>
+                <a:spcAft>
+                  <a:spcPts val="0"/>
+                </a:spcAft>
+                <a:buNone/>
+              </a:pPr>
+              <a:r>
+                <a:t/>
+              </a:r>
+              <a:endParaRPr/>
+            </a:p>
+          </p:txBody>
+        </p:sp>
+        <p:sp>
+          <p:nvSpPr>
+            <p:cNvPr id="396" name="Google Shape;396;p33"/>
+            <p:cNvSpPr/>
+            <p:nvPr/>
+          </p:nvSpPr>
+          <p:spPr>
+            <a:xfrm>
+              <a:off x="3487138" y="3179650"/>
+              <a:ext cx="54350" cy="53000"/>
+            </a:xfrm>
+            <a:custGeom>
+              <a:rect b="b" l="l" r="r" t="t"/>
+              <a:pathLst>
+                <a:path extrusionOk="0" h="2120" w="2174">
+                  <a:moveTo>
+                    <a:pt x="294" y="0"/>
+                  </a:moveTo>
+                  <a:cubicBezTo>
+                    <a:pt x="218" y="0"/>
+                    <a:pt x="144" y="24"/>
+                    <a:pt x="82" y="70"/>
+                  </a:cubicBezTo>
+                  <a:cubicBezTo>
+                    <a:pt x="0" y="193"/>
+                    <a:pt x="0" y="367"/>
+                    <a:pt x="82" y="490"/>
+                  </a:cubicBezTo>
+                  <a:lnTo>
+                    <a:pt x="636" y="1044"/>
+                  </a:lnTo>
+                  <a:lnTo>
+                    <a:pt x="82" y="1607"/>
+                  </a:lnTo>
+                  <a:cubicBezTo>
+                    <a:pt x="0" y="1730"/>
+                    <a:pt x="0" y="1905"/>
+                    <a:pt x="82" y="2028"/>
+                  </a:cubicBezTo>
+                  <a:cubicBezTo>
+                    <a:pt x="164" y="2069"/>
+                    <a:pt x="205" y="2120"/>
+                    <a:pt x="298" y="2120"/>
+                  </a:cubicBezTo>
+                  <a:cubicBezTo>
+                    <a:pt x="380" y="2120"/>
+                    <a:pt x="462" y="2069"/>
+                    <a:pt x="513" y="2028"/>
+                  </a:cubicBezTo>
+                  <a:lnTo>
+                    <a:pt x="1067" y="1474"/>
+                  </a:lnTo>
+                  <a:lnTo>
+                    <a:pt x="1620" y="2028"/>
+                  </a:lnTo>
+                  <a:cubicBezTo>
+                    <a:pt x="1661" y="2069"/>
+                    <a:pt x="1743" y="2120"/>
+                    <a:pt x="1835" y="2120"/>
+                  </a:cubicBezTo>
+                  <a:cubicBezTo>
+                    <a:pt x="1917" y="2120"/>
+                    <a:pt x="1999" y="2069"/>
+                    <a:pt x="2051" y="2028"/>
+                  </a:cubicBezTo>
+                  <a:cubicBezTo>
+                    <a:pt x="2174" y="1905"/>
+                    <a:pt x="2174" y="1730"/>
+                    <a:pt x="2051" y="1607"/>
+                  </a:cubicBezTo>
+                  <a:lnTo>
+                    <a:pt x="1487" y="1044"/>
+                  </a:lnTo>
+                  <a:lnTo>
+                    <a:pt x="2051" y="490"/>
+                  </a:lnTo>
+                  <a:cubicBezTo>
+                    <a:pt x="2174" y="367"/>
+                    <a:pt x="2174" y="193"/>
+                    <a:pt x="2051" y="70"/>
+                  </a:cubicBezTo>
+                  <a:cubicBezTo>
+                    <a:pt x="1984" y="24"/>
+                    <a:pt x="1907" y="0"/>
+                    <a:pt x="1832" y="0"/>
+                  </a:cubicBezTo>
+                  <a:cubicBezTo>
+                    <a:pt x="1756" y="0"/>
+                    <a:pt x="1682" y="24"/>
+                    <a:pt x="1620" y="70"/>
+                  </a:cubicBezTo>
+                  <a:lnTo>
+                    <a:pt x="1067" y="623"/>
+                  </a:lnTo>
+                  <a:lnTo>
+                    <a:pt x="513" y="70"/>
+                  </a:lnTo>
+                  <a:cubicBezTo>
+                    <a:pt x="446" y="24"/>
+                    <a:pt x="369" y="0"/>
+                    <a:pt x="294" y="0"/>
+                  </a:cubicBezTo>
+                  <a:close/>
+                </a:path>
+              </a:pathLst>
+            </a:custGeom>
+            <a:solidFill>
+              <a:srgbClr val="333333"/>
+            </a:solidFill>
+            <a:ln>
+              <a:noFill/>
+            </a:ln>
+          </p:spPr>
+          <p:txBody>
+            <a:bodyPr anchorCtr="0" anchor="ctr" bIns="91425" lIns="91425" spcFirstLastPara="1" rIns="91425" wrap="square" tIns="91425">
+              <a:noAutofit/>
+            </a:bodyPr>
+            <a:lstStyle/>
+            <a:p>
+              <a:pPr indent="0" lvl="0" marL="0" rtl="0" algn="l">
+                <a:spcBef>
+                  <a:spcPts val="0"/>
+                </a:spcBef>
+                <a:spcAft>
+                  <a:spcPts val="0"/>
+                </a:spcAft>
+                <a:buNone/>
+              </a:pPr>
+              <a:r>
+                <a:t/>
+              </a:r>
+              <a:endParaRPr/>
+            </a:p>
+          </p:txBody>
+        </p:sp>
+        <p:sp>
+          <p:nvSpPr>
+            <p:cNvPr id="397" name="Google Shape;397;p33"/>
+            <p:cNvSpPr/>
+            <p:nvPr/>
+          </p:nvSpPr>
+          <p:spPr>
+            <a:xfrm>
+              <a:off x="3305438" y="3129975"/>
+              <a:ext cx="39475" cy="48100"/>
+            </a:xfrm>
+            <a:custGeom>
+              <a:rect b="b" l="l" r="r" t="t"/>
+              <a:pathLst>
+                <a:path extrusionOk="0" h="1924" w="1579">
+                  <a:moveTo>
+                    <a:pt x="352" y="0"/>
+                  </a:moveTo>
+                  <a:cubicBezTo>
+                    <a:pt x="296" y="0"/>
+                    <a:pt x="236" y="15"/>
+                    <a:pt x="174" y="47"/>
+                  </a:cubicBezTo>
+                  <a:cubicBezTo>
+                    <a:pt x="41" y="170"/>
+                    <a:pt x="0" y="345"/>
+                    <a:pt x="92" y="468"/>
+                  </a:cubicBezTo>
+                  <a:lnTo>
+                    <a:pt x="984" y="1800"/>
+                  </a:lnTo>
+                  <a:cubicBezTo>
+                    <a:pt x="1025" y="1882"/>
+                    <a:pt x="1118" y="1923"/>
+                    <a:pt x="1241" y="1923"/>
+                  </a:cubicBezTo>
+                  <a:cubicBezTo>
+                    <a:pt x="1282" y="1923"/>
+                    <a:pt x="1323" y="1882"/>
+                    <a:pt x="1415" y="1882"/>
+                  </a:cubicBezTo>
+                  <a:cubicBezTo>
+                    <a:pt x="1538" y="1800"/>
+                    <a:pt x="1579" y="1585"/>
+                    <a:pt x="1456" y="1452"/>
+                  </a:cubicBezTo>
+                  <a:lnTo>
+                    <a:pt x="605" y="129"/>
+                  </a:lnTo>
+                  <a:cubicBezTo>
+                    <a:pt x="545" y="50"/>
+                    <a:pt x="455" y="0"/>
+                    <a:pt x="352" y="0"/>
+                  </a:cubicBezTo>
+                  <a:close/>
+                </a:path>
+              </a:pathLst>
+            </a:custGeom>
+            <a:solidFill>
+              <a:srgbClr val="333333"/>
+            </a:solidFill>
+            <a:ln>
+              <a:noFill/>
+            </a:ln>
+          </p:spPr>
+          <p:txBody>
+            <a:bodyPr anchorCtr="0" anchor="ctr" bIns="91425" lIns="91425" spcFirstLastPara="1" rIns="91425" wrap="square" tIns="91425">
+              <a:noAutofit/>
+            </a:bodyPr>
+            <a:lstStyle/>
+            <a:p>
+              <a:pPr indent="0" lvl="0" marL="0" rtl="0" algn="l">
+                <a:spcBef>
+                  <a:spcPts val="0"/>
+                </a:spcBef>
+                <a:spcAft>
+                  <a:spcPts val="0"/>
+                </a:spcAft>
+                <a:buNone/>
+              </a:pPr>
+              <a:r>
+                <a:t/>
+              </a:r>
+              <a:endParaRPr/>
+            </a:p>
+          </p:txBody>
+        </p:sp>
+        <p:sp>
+          <p:nvSpPr>
+            <p:cNvPr id="398" name="Google Shape;398;p33"/>
+            <p:cNvSpPr/>
+            <p:nvPr/>
+          </p:nvSpPr>
+          <p:spPr>
+            <a:xfrm>
+              <a:off x="3410238" y="3080650"/>
+              <a:ext cx="60775" cy="58975"/>
+            </a:xfrm>
+            <a:custGeom>
+              <a:rect b="b" l="l" r="r" t="t"/>
+              <a:pathLst>
+                <a:path extrusionOk="0" h="2359" w="2431">
+                  <a:moveTo>
+                    <a:pt x="2088" y="1"/>
+                  </a:moveTo>
+                  <a:cubicBezTo>
+                    <a:pt x="2013" y="1"/>
+                    <a:pt x="1939" y="32"/>
+                    <a:pt x="1877" y="93"/>
+                  </a:cubicBezTo>
+                  <a:lnTo>
+                    <a:pt x="124" y="1846"/>
+                  </a:lnTo>
+                  <a:cubicBezTo>
+                    <a:pt x="1" y="1979"/>
+                    <a:pt x="1" y="2143"/>
+                    <a:pt x="124" y="2277"/>
+                  </a:cubicBezTo>
+                  <a:cubicBezTo>
+                    <a:pt x="165" y="2318"/>
+                    <a:pt x="257" y="2359"/>
+                    <a:pt x="298" y="2359"/>
+                  </a:cubicBezTo>
+                  <a:cubicBezTo>
+                    <a:pt x="380" y="2359"/>
+                    <a:pt x="462" y="2318"/>
+                    <a:pt x="514" y="2277"/>
+                  </a:cubicBezTo>
+                  <a:lnTo>
+                    <a:pt x="2308" y="483"/>
+                  </a:lnTo>
+                  <a:cubicBezTo>
+                    <a:pt x="2431" y="390"/>
+                    <a:pt x="2431" y="185"/>
+                    <a:pt x="2308" y="93"/>
+                  </a:cubicBezTo>
+                  <a:cubicBezTo>
+                    <a:pt x="2241" y="32"/>
+                    <a:pt x="2164" y="1"/>
+                    <a:pt x="2088" y="1"/>
+                  </a:cubicBezTo>
+                  <a:close/>
+                </a:path>
+              </a:pathLst>
+            </a:custGeom>
+            <a:solidFill>
+              <a:srgbClr val="B2B2B2"/>
+            </a:solidFill>
+            <a:ln>
+              <a:noFill/>
+            </a:ln>
+          </p:spPr>
+          <p:txBody>
+            <a:bodyPr anchorCtr="0" anchor="ctr" bIns="91425" lIns="91425" spcFirstLastPara="1" rIns="91425" wrap="square" tIns="91425">
+              <a:noAutofit/>
+            </a:bodyPr>
+            <a:lstStyle/>
+            <a:p>
+              <a:pPr indent="0" lvl="0" marL="0" rtl="0" algn="l">
+                <a:spcBef>
+                  <a:spcPts val="0"/>
+                </a:spcBef>
+                <a:spcAft>
+                  <a:spcPts val="0"/>
+                </a:spcAft>
+                <a:buNone/>
+              </a:pPr>
+              <a:r>
+                <a:t/>
+              </a:r>
+              <a:endParaRPr/>
+            </a:p>
+          </p:txBody>
+        </p:sp>
+        <p:sp>
+          <p:nvSpPr>
+            <p:cNvPr id="399" name="Google Shape;399;p33"/>
+            <p:cNvSpPr/>
+            <p:nvPr/>
+          </p:nvSpPr>
+          <p:spPr>
+            <a:xfrm>
+              <a:off x="3403838" y="3080925"/>
+              <a:ext cx="17975" cy="14875"/>
+            </a:xfrm>
+            <a:custGeom>
+              <a:rect b="b" l="l" r="r" t="t"/>
+              <a:pathLst>
+                <a:path extrusionOk="0" h="595" w="719">
+                  <a:moveTo>
+                    <a:pt x="339" y="0"/>
+                  </a:moveTo>
+                  <a:cubicBezTo>
+                    <a:pt x="257" y="0"/>
+                    <a:pt x="165" y="41"/>
+                    <a:pt x="83" y="123"/>
+                  </a:cubicBezTo>
+                  <a:cubicBezTo>
+                    <a:pt x="1" y="338"/>
+                    <a:pt x="124" y="595"/>
+                    <a:pt x="339" y="595"/>
+                  </a:cubicBezTo>
+                  <a:cubicBezTo>
+                    <a:pt x="554" y="595"/>
+                    <a:pt x="718" y="379"/>
+                    <a:pt x="636" y="174"/>
+                  </a:cubicBezTo>
+                  <a:cubicBezTo>
+                    <a:pt x="595" y="41"/>
+                    <a:pt x="462" y="0"/>
+                    <a:pt x="380" y="0"/>
+                  </a:cubicBezTo>
+                  <a:close/>
+                </a:path>
+              </a:pathLst>
+            </a:custGeom>
+            <a:solidFill>
+              <a:srgbClr val="B2B2B2"/>
+            </a:solidFill>
+            <a:ln>
+              <a:noFill/>
+            </a:ln>
+          </p:spPr>
+          <p:txBody>
+            <a:bodyPr anchorCtr="0" anchor="ctr" bIns="91425" lIns="91425" spcFirstLastPara="1" rIns="91425" wrap="square" tIns="91425">
+              <a:noAutofit/>
+            </a:bodyPr>
+            <a:lstStyle/>
+            <a:p>
+              <a:pPr indent="0" lvl="0" marL="0" rtl="0" algn="l">
+                <a:spcBef>
+                  <a:spcPts val="0"/>
+                </a:spcBef>
+                <a:spcAft>
+                  <a:spcPts val="0"/>
+                </a:spcAft>
+                <a:buNone/>
+              </a:pPr>
+              <a:r>
+                <a:t/>
+              </a:r>
+              <a:endParaRPr/>
+            </a:p>
+          </p:txBody>
+        </p:sp>
+        <p:sp>
+          <p:nvSpPr>
+            <p:cNvPr id="400" name="Google Shape;400;p33"/>
+            <p:cNvSpPr/>
+            <p:nvPr/>
+          </p:nvSpPr>
+          <p:spPr>
+            <a:xfrm>
+              <a:off x="3458188" y="3130125"/>
+              <a:ext cx="18200" cy="14875"/>
+            </a:xfrm>
+            <a:custGeom>
+              <a:rect b="b" l="l" r="r" t="t"/>
+              <a:pathLst>
+                <a:path extrusionOk="0" h="595" w="728">
+                  <a:moveTo>
+                    <a:pt x="338" y="0"/>
+                  </a:moveTo>
+                  <a:cubicBezTo>
+                    <a:pt x="256" y="0"/>
+                    <a:pt x="174" y="82"/>
+                    <a:pt x="133" y="164"/>
+                  </a:cubicBezTo>
+                  <a:cubicBezTo>
+                    <a:pt x="0" y="380"/>
+                    <a:pt x="174" y="595"/>
+                    <a:pt x="390" y="595"/>
+                  </a:cubicBezTo>
+                  <a:cubicBezTo>
+                    <a:pt x="554" y="595"/>
+                    <a:pt x="728" y="380"/>
+                    <a:pt x="646" y="164"/>
+                  </a:cubicBezTo>
+                  <a:cubicBezTo>
+                    <a:pt x="595" y="82"/>
+                    <a:pt x="472" y="0"/>
+                    <a:pt x="390" y="0"/>
+                  </a:cubicBezTo>
+                  <a:close/>
+                </a:path>
+              </a:pathLst>
+            </a:custGeom>
+            <a:solidFill>
+              <a:srgbClr val="333333"/>
+            </a:solidFill>
+            <a:ln>
+              <a:noFill/>
+            </a:ln>
+          </p:spPr>
+          <p:txBody>
+            <a:bodyPr anchorCtr="0" anchor="ctr" bIns="91425" lIns="91425" spcFirstLastPara="1" rIns="91425" wrap="square" tIns="91425">
+              <a:noAutofit/>
+            </a:bodyPr>
+            <a:lstStyle/>
+            <a:p>
+              <a:pPr indent="0" lvl="0" marL="0" rtl="0" algn="l">
+                <a:spcBef>
+                  <a:spcPts val="0"/>
+                </a:spcBef>
+                <a:spcAft>
+                  <a:spcPts val="0"/>
+                </a:spcAft>
+                <a:buNone/>
+              </a:pPr>
+              <a:r>
+                <a:t/>
+              </a:r>
+              <a:endParaRPr/>
+            </a:p>
+          </p:txBody>
+        </p:sp>
+        <p:sp>
+          <p:nvSpPr>
+            <p:cNvPr id="401" name="Google Shape;401;p33"/>
+            <p:cNvSpPr/>
+            <p:nvPr/>
+          </p:nvSpPr>
+          <p:spPr>
+            <a:xfrm>
+              <a:off x="3284163" y="3201375"/>
+              <a:ext cx="38450" cy="58975"/>
+            </a:xfrm>
+            <a:custGeom>
+              <a:rect b="b" l="l" r="r" t="t"/>
+              <a:pathLst>
+                <a:path extrusionOk="0" h="2359" w="1538">
+                  <a:moveTo>
+                    <a:pt x="342" y="0"/>
+                  </a:moveTo>
+                  <a:cubicBezTo>
+                    <a:pt x="267" y="0"/>
+                    <a:pt x="190" y="31"/>
+                    <a:pt x="123" y="93"/>
+                  </a:cubicBezTo>
+                  <a:cubicBezTo>
+                    <a:pt x="0" y="226"/>
+                    <a:pt x="0" y="390"/>
+                    <a:pt x="123" y="523"/>
+                  </a:cubicBezTo>
+                  <a:cubicBezTo>
+                    <a:pt x="513" y="902"/>
+                    <a:pt x="769" y="1374"/>
+                    <a:pt x="892" y="1928"/>
+                  </a:cubicBezTo>
+                  <a:lnTo>
+                    <a:pt x="892" y="2102"/>
+                  </a:lnTo>
+                  <a:cubicBezTo>
+                    <a:pt x="943" y="2225"/>
+                    <a:pt x="1066" y="2358"/>
+                    <a:pt x="1200" y="2358"/>
+                  </a:cubicBezTo>
+                  <a:cubicBezTo>
+                    <a:pt x="1241" y="2358"/>
+                    <a:pt x="1241" y="2358"/>
+                    <a:pt x="1282" y="2317"/>
+                  </a:cubicBezTo>
+                  <a:cubicBezTo>
+                    <a:pt x="1405" y="2317"/>
+                    <a:pt x="1538" y="2143"/>
+                    <a:pt x="1497" y="1969"/>
+                  </a:cubicBezTo>
+                  <a:lnTo>
+                    <a:pt x="1456" y="1805"/>
+                  </a:lnTo>
+                  <a:cubicBezTo>
+                    <a:pt x="1323" y="1159"/>
+                    <a:pt x="1025" y="564"/>
+                    <a:pt x="554" y="93"/>
+                  </a:cubicBezTo>
+                  <a:cubicBezTo>
+                    <a:pt x="492" y="31"/>
+                    <a:pt x="418" y="0"/>
+                    <a:pt x="342" y="0"/>
+                  </a:cubicBezTo>
+                  <a:close/>
+                </a:path>
+              </a:pathLst>
+            </a:custGeom>
+            <a:solidFill>
+              <a:srgbClr val="333333"/>
+            </a:solidFill>
+            <a:ln>
+              <a:noFill/>
+            </a:ln>
+          </p:spPr>
+          <p:txBody>
+            <a:bodyPr anchorCtr="0" anchor="ctr" bIns="91425" lIns="91425" spcFirstLastPara="1" rIns="91425" wrap="square" tIns="91425">
+              <a:noAutofit/>
+            </a:bodyPr>
+            <a:lstStyle/>
+            <a:p>
+              <a:pPr indent="0" lvl="0" marL="0" rtl="0" algn="l">
+                <a:spcBef>
+                  <a:spcPts val="0"/>
+                </a:spcBef>
+                <a:spcAft>
+                  <a:spcPts val="0"/>
+                </a:spcAft>
+                <a:buNone/>
+              </a:pPr>
+              <a:r>
+                <a:t/>
+              </a:r>
+              <a:endParaRPr/>
+            </a:p>
+          </p:txBody>
+        </p:sp>
+        <p:sp>
+          <p:nvSpPr>
+            <p:cNvPr id="402" name="Google Shape;402;p33"/>
+            <p:cNvSpPr/>
+            <p:nvPr/>
+          </p:nvSpPr>
+          <p:spPr>
+            <a:xfrm>
+              <a:off x="3557613" y="3201375"/>
+              <a:ext cx="38475" cy="58975"/>
+            </a:xfrm>
+            <a:custGeom>
+              <a:rect b="b" l="l" r="r" t="t"/>
+              <a:pathLst>
+                <a:path extrusionOk="0" h="2359" w="1539">
+                  <a:moveTo>
+                    <a:pt x="1194" y="0"/>
+                  </a:moveTo>
+                  <a:cubicBezTo>
+                    <a:pt x="1118" y="0"/>
+                    <a:pt x="1041" y="31"/>
+                    <a:pt x="974" y="93"/>
+                  </a:cubicBezTo>
+                  <a:cubicBezTo>
+                    <a:pt x="513" y="564"/>
+                    <a:pt x="206" y="1159"/>
+                    <a:pt x="83" y="1805"/>
+                  </a:cubicBezTo>
+                  <a:lnTo>
+                    <a:pt x="42" y="1969"/>
+                  </a:lnTo>
+                  <a:cubicBezTo>
+                    <a:pt x="1" y="2143"/>
+                    <a:pt x="124" y="2317"/>
+                    <a:pt x="257" y="2317"/>
+                  </a:cubicBezTo>
+                  <a:cubicBezTo>
+                    <a:pt x="298" y="2358"/>
+                    <a:pt x="298" y="2358"/>
+                    <a:pt x="339" y="2358"/>
+                  </a:cubicBezTo>
+                  <a:cubicBezTo>
+                    <a:pt x="462" y="2358"/>
+                    <a:pt x="595" y="2225"/>
+                    <a:pt x="636" y="2102"/>
+                  </a:cubicBezTo>
+                  <a:lnTo>
+                    <a:pt x="636" y="1928"/>
+                  </a:lnTo>
+                  <a:cubicBezTo>
+                    <a:pt x="769" y="1374"/>
+                    <a:pt x="1026" y="902"/>
+                    <a:pt x="1405" y="523"/>
+                  </a:cubicBezTo>
+                  <a:cubicBezTo>
+                    <a:pt x="1538" y="390"/>
+                    <a:pt x="1538" y="226"/>
+                    <a:pt x="1405" y="93"/>
+                  </a:cubicBezTo>
+                  <a:cubicBezTo>
+                    <a:pt x="1344" y="31"/>
+                    <a:pt x="1269" y="0"/>
+                    <a:pt x="1194" y="0"/>
+                  </a:cubicBezTo>
+                  <a:close/>
+                </a:path>
+              </a:pathLst>
+            </a:custGeom>
+            <a:solidFill>
+              <a:srgbClr val="B2B2B2"/>
+            </a:solidFill>
+            <a:ln>
+              <a:noFill/>
+            </a:ln>
+          </p:spPr>
+          <p:txBody>
+            <a:bodyPr anchorCtr="0" anchor="ctr" bIns="91425" lIns="91425" spcFirstLastPara="1" rIns="91425" wrap="square" tIns="91425">
+              <a:noAutofit/>
+            </a:bodyPr>
+            <a:lstStyle/>
+            <a:p>
+              <a:pPr indent="0" lvl="0" marL="0" rtl="0" algn="l">
+                <a:spcBef>
+                  <a:spcPts val="0"/>
+                </a:spcBef>
+                <a:spcAft>
+                  <a:spcPts val="0"/>
+                </a:spcAft>
+                <a:buNone/>
+              </a:pPr>
+              <a:r>
+                <a:t/>
+              </a:r>
+              <a:endParaRPr/>
+            </a:p>
+          </p:txBody>
+        </p:sp>
+        <p:sp>
+          <p:nvSpPr>
+            <p:cNvPr id="403" name="Google Shape;403;p33"/>
+            <p:cNvSpPr/>
+            <p:nvPr/>
+          </p:nvSpPr>
+          <p:spPr>
+            <a:xfrm>
+              <a:off x="3530713" y="3124475"/>
+              <a:ext cx="26925" cy="25925"/>
+            </a:xfrm>
+            <a:custGeom>
+              <a:rect b="b" l="l" r="r" t="t"/>
+              <a:pathLst>
+                <a:path extrusionOk="0" h="1037" w="1077">
+                  <a:moveTo>
+                    <a:pt x="747" y="1"/>
+                  </a:moveTo>
+                  <a:cubicBezTo>
+                    <a:pt x="667" y="1"/>
+                    <a:pt x="579" y="32"/>
+                    <a:pt x="513" y="93"/>
+                  </a:cubicBezTo>
+                  <a:lnTo>
+                    <a:pt x="92" y="524"/>
+                  </a:lnTo>
+                  <a:cubicBezTo>
+                    <a:pt x="0" y="647"/>
+                    <a:pt x="0" y="821"/>
+                    <a:pt x="92" y="944"/>
+                  </a:cubicBezTo>
+                  <a:cubicBezTo>
+                    <a:pt x="174" y="1036"/>
+                    <a:pt x="215" y="1036"/>
+                    <a:pt x="308" y="1036"/>
+                  </a:cubicBezTo>
+                  <a:cubicBezTo>
+                    <a:pt x="390" y="1036"/>
+                    <a:pt x="472" y="1036"/>
+                    <a:pt x="513" y="944"/>
+                  </a:cubicBezTo>
+                  <a:lnTo>
+                    <a:pt x="943" y="524"/>
+                  </a:lnTo>
+                  <a:cubicBezTo>
+                    <a:pt x="1077" y="390"/>
+                    <a:pt x="1077" y="226"/>
+                    <a:pt x="943" y="93"/>
+                  </a:cubicBezTo>
+                  <a:cubicBezTo>
+                    <a:pt x="902" y="32"/>
+                    <a:pt x="828" y="1"/>
+                    <a:pt x="747" y="1"/>
+                  </a:cubicBezTo>
+                  <a:close/>
+                </a:path>
+              </a:pathLst>
+            </a:custGeom>
+            <a:solidFill>
+              <a:srgbClr val="B2B2B2"/>
+            </a:solidFill>
+            <a:ln>
+              <a:noFill/>
+            </a:ln>
+          </p:spPr>
+          <p:txBody>
+            <a:bodyPr anchorCtr="0" anchor="ctr" bIns="91425" lIns="91425" spcFirstLastPara="1" rIns="91425" wrap="square" tIns="91425">
+              <a:noAutofit/>
+            </a:bodyPr>
+            <a:lstStyle/>
+            <a:p>
+              <a:pPr indent="0" lvl="0" marL="0" rtl="0" algn="l">
+                <a:spcBef>
+                  <a:spcPts val="0"/>
+                </a:spcBef>
+                <a:spcAft>
+                  <a:spcPts val="0"/>
+                </a:spcAft>
+                <a:buNone/>
+              </a:pPr>
+              <a:r>
+                <a:t/>
+              </a:r>
+              <a:endParaRPr/>
+            </a:p>
+          </p:txBody>
+        </p:sp>
+      </p:grpSp>
     </p:spTree>
   </p:cSld>
   <p:clrMapOvr>
@@ -34163,7 +34450,7 @@
   <p:cSld>
     <p:spTree>
       <p:nvGrpSpPr>
-        <p:cNvPr id="408" name="Shape 408"/>
+        <p:cNvPr id="407" name="Shape 407"/>
         <p:cNvGrpSpPr/>
         <p:nvPr/>
       </p:nvGrpSpPr>
@@ -34177,7 +34464,7 @@
       </p:grpSpPr>
       <p:sp>
         <p:nvSpPr>
-          <p:cNvPr id="409" name="Google Shape;409;p34"/>
+          <p:cNvPr id="408" name="Google Shape;408;p34"/>
           <p:cNvSpPr txBox="1"/>
           <p:nvPr>
             <p:ph type="title"/>
@@ -34217,7 +34504,7 @@
       </p:sp>
       <p:graphicFrame>
         <p:nvGraphicFramePr>
-          <p:cNvPr id="410" name="Google Shape;410;p34"/>
+          <p:cNvPr id="409" name="Google Shape;409;p34"/>
           <p:cNvGraphicFramePr/>
           <p:nvPr/>
         </p:nvGraphicFramePr>
@@ -34230,7 +34517,7 @@
             <a:tbl>
               <a:tblPr>
                 <a:noFill/>
-                <a:tableStyleId>{363EE216-B138-42D0-A63F-94525CC0BD0B}</a:tableStyleId>
+                <a:tableStyleId>{AE2FC687-5EF9-485A-9C1A-490ABB51D020}</a:tableStyleId>
               </a:tblPr>
               <a:tblGrid>
                 <a:gridCol w="923125"/>
@@ -36697,7 +36984,7 @@
       </p:graphicFrame>
       <p:sp>
         <p:nvSpPr>
-          <p:cNvPr id="411" name="Google Shape;411;p34"/>
+          <p:cNvPr id="410" name="Google Shape;410;p34"/>
           <p:cNvSpPr txBox="1"/>
           <p:nvPr>
             <p:ph idx="12" type="sldNum"/>
@@ -36737,7 +37024,7 @@
       </p:sp>
       <p:sp>
         <p:nvSpPr>
-          <p:cNvPr id="412" name="Google Shape;412;p34"/>
+          <p:cNvPr id="411" name="Google Shape;411;p34"/>
           <p:cNvSpPr txBox="1"/>
           <p:nvPr/>
         </p:nvSpPr>
@@ -36845,7 +37132,7 @@
   <p:cSld>
     <p:spTree>
       <p:nvGrpSpPr>
-        <p:cNvPr id="416" name="Shape 416"/>
+        <p:cNvPr id="415" name="Shape 415"/>
         <p:cNvGrpSpPr/>
         <p:nvPr/>
       </p:nvGrpSpPr>
@@ -36859,7 +37146,7 @@
       </p:grpSpPr>
       <p:sp>
         <p:nvSpPr>
-          <p:cNvPr id="417" name="Google Shape;417;p35"/>
+          <p:cNvPr id="416" name="Google Shape;416;p35"/>
           <p:cNvSpPr txBox="1"/>
           <p:nvPr>
             <p:ph type="title"/>
@@ -36899,7 +37186,7 @@
       </p:sp>
       <p:sp>
         <p:nvSpPr>
-          <p:cNvPr id="418" name="Google Shape;418;p35"/>
+          <p:cNvPr id="417" name="Google Shape;417;p35"/>
           <p:cNvSpPr txBox="1"/>
           <p:nvPr>
             <p:ph idx="1" type="subTitle"/>
@@ -36984,7 +37271,7 @@
       </p:sp>
       <p:sp>
         <p:nvSpPr>
-          <p:cNvPr id="419" name="Google Shape;419;p35"/>
+          <p:cNvPr id="418" name="Google Shape;418;p35"/>
           <p:cNvSpPr txBox="1"/>
           <p:nvPr>
             <p:ph idx="12" type="sldNum"/>
@@ -37031,6 +37318,285 @@
 </file>
 
 <file path=ppt/theme/theme1.xml><?xml version="1.0" encoding="utf-8"?>
+<a:theme xmlns:a="http://schemas.openxmlformats.org/drawingml/2006/main" xmlns:r="http://schemas.openxmlformats.org/officeDocument/2006/relationships">
+  <a:themeElements>
+    <a:clrScheme name="Default">
+      <a:dk1>
+        <a:srgbClr val="000000"/>
+      </a:dk1>
+      <a:lt1>
+        <a:srgbClr val="FFFFFF"/>
+      </a:lt1>
+      <a:dk2>
+        <a:srgbClr val="158158"/>
+      </a:dk2>
+      <a:lt2>
+        <a:srgbClr val="F3F3F3"/>
+      </a:lt2>
+      <a:accent1>
+        <a:srgbClr val="058DC7"/>
+      </a:accent1>
+      <a:accent2>
+        <a:srgbClr val="50B432"/>
+      </a:accent2>
+      <a:accent3>
+        <a:srgbClr val="ED561B"/>
+      </a:accent3>
+      <a:accent4>
+        <a:srgbClr val="EDEF00"/>
+      </a:accent4>
+      <a:accent5>
+        <a:srgbClr val="24CBE5"/>
+      </a:accent5>
+      <a:accent6>
+        <a:srgbClr val="64E572"/>
+      </a:accent6>
+      <a:hlink>
+        <a:srgbClr val="2200CC"/>
+      </a:hlink>
+      <a:folHlink>
+        <a:srgbClr val="551A8B"/>
+      </a:folHlink>
+    </a:clrScheme>
+    <a:fontScheme name="Office">
+      <a:majorFont>
+        <a:latin typeface="Arial"/>
+        <a:ea typeface=""/>
+        <a:cs typeface=""/>
+        <a:font script="Jpan" typeface="ＭＳ Ｐゴシック"/>
+        <a:font script="Hang" typeface="맑은 고딕"/>
+        <a:font script="Hans" typeface="宋体"/>
+        <a:font script="Hant" typeface="新細明體"/>
+        <a:font script="Arab" typeface="Times New Roman"/>
+        <a:font script="Hebr" typeface="Times New Roman"/>
+        <a:font script="Thai" typeface="Angsana New"/>
+        <a:font script="Ethi" typeface="Nyala"/>
+        <a:font script="Beng" typeface="Vrinda"/>
+        <a:font script="Gujr" typeface="Shruti"/>
+        <a:font script="Khmr" typeface="MoolBoran"/>
+        <a:font script="Knda" typeface="Tunga"/>
+        <a:font script="Guru" typeface="Raavi"/>
+        <a:font script="Cans" typeface="Euphemia"/>
+        <a:font script="Cher" typeface="Plantagenet Cherokee"/>
+        <a:font script="Yiii" typeface="Microsoft Yi Baiti"/>
+        <a:font script="Tibt" typeface="Microsoft Himalaya"/>
+        <a:font script="Thaa" typeface="MV Boli"/>
+        <a:font script="Deva" typeface="Mangal"/>
+        <a:font script="Telu" typeface="Gautami"/>
+        <a:font script="Taml" typeface="Latha"/>
+        <a:font script="Syrc" typeface="Estrangelo Edessa"/>
+        <a:font script="Orya" typeface="Kalinga"/>
+        <a:font script="Mlym" typeface="Kartika"/>
+        <a:font script="Laoo" typeface="DokChampa"/>
+        <a:font script="Sinh" typeface="Iskoola Pota"/>
+        <a:font script="Mong" typeface="Mongolian Baiti"/>
+        <a:font script="Viet" typeface="Times New Roman"/>
+        <a:font script="Uigh" typeface="Microsoft Uighur"/>
+        <a:font script="Geor" typeface="Sylfaen"/>
+      </a:majorFont>
+      <a:minorFont>
+        <a:latin typeface="Arial"/>
+        <a:ea typeface=""/>
+        <a:cs typeface=""/>
+        <a:font script="Jpan" typeface="ＭＳ Ｐゴシック"/>
+        <a:font script="Hang" typeface="맑은 고딕"/>
+        <a:font script="Hans" typeface="宋体"/>
+        <a:font script="Hant" typeface="新細明體"/>
+        <a:font script="Arab" typeface="Arial"/>
+        <a:font script="Hebr" typeface="Arial"/>
+        <a:font script="Thai" typeface="Cordia New"/>
+        <a:font script="Ethi" typeface="Nyala"/>
+        <a:font script="Beng" typeface="Vrinda"/>
+        <a:font script="Gujr" typeface="Shruti"/>
+        <a:font script="Khmr" typeface="DaunPenh"/>
+        <a:font script="Knda" typeface="Tunga"/>
+        <a:font script="Guru" typeface="Raavi"/>
+        <a:font script="Cans" typeface="Euphemia"/>
+        <a:font script="Cher" typeface="Plantagenet Cherokee"/>
+        <a:font script="Yiii" typeface="Microsoft Yi Baiti"/>
+        <a:font script="Tibt" typeface="Microsoft Himalaya"/>
+        <a:font script="Thaa" typeface="MV Boli"/>
+        <a:font script="Deva" typeface="Mangal"/>
+        <a:font script="Telu" typeface="Gautami"/>
+        <a:font script="Taml" typeface="Latha"/>
+        <a:font script="Syrc" typeface="Estrangelo Edessa"/>
+        <a:font script="Orya" typeface="Kalinga"/>
+        <a:font script="Mlym" typeface="Kartika"/>
+        <a:font script="Laoo" typeface="DokChampa"/>
+        <a:font script="Sinh" typeface="Iskoola Pota"/>
+        <a:font script="Mong" typeface="Mongolian Baiti"/>
+        <a:font script="Viet" typeface="Arial"/>
+        <a:font script="Uigh" typeface="Microsoft Uighur"/>
+        <a:font script="Geor" typeface="Sylfaen"/>
+      </a:minorFont>
+    </a:fontScheme>
+    <a:fmtScheme name="Office">
+      <a:fillStyleLst>
+        <a:solidFill>
+          <a:schemeClr val="phClr"/>
+        </a:solidFill>
+        <a:gradFill rotWithShape="1">
+          <a:gsLst>
+            <a:gs pos="0">
+              <a:schemeClr val="phClr">
+                <a:tint val="50000"/>
+                <a:satMod val="300000"/>
+              </a:schemeClr>
+            </a:gs>
+            <a:gs pos="35000">
+              <a:schemeClr val="phClr">
+                <a:tint val="37000"/>
+                <a:satMod val="300000"/>
+              </a:schemeClr>
+            </a:gs>
+            <a:gs pos="100000">
+              <a:schemeClr val="phClr">
+                <a:tint val="15000"/>
+                <a:satMod val="350000"/>
+              </a:schemeClr>
+            </a:gs>
+          </a:gsLst>
+          <a:lin ang="16200000" scaled="1"/>
+        </a:gradFill>
+        <a:gradFill rotWithShape="1">
+          <a:gsLst>
+            <a:gs pos="0">
+              <a:schemeClr val="phClr">
+                <a:tint val="100000"/>
+                <a:shade val="100000"/>
+                <a:satMod val="130000"/>
+              </a:schemeClr>
+            </a:gs>
+            <a:gs pos="100000">
+              <a:schemeClr val="phClr">
+                <a:tint val="50000"/>
+                <a:shade val="100000"/>
+                <a:satMod val="350000"/>
+              </a:schemeClr>
+            </a:gs>
+          </a:gsLst>
+          <a:lin ang="16200000" scaled="0"/>
+        </a:gradFill>
+      </a:fillStyleLst>
+      <a:lnStyleLst>
+        <a:ln w="9525" cap="flat" cmpd="sng" algn="ctr">
+          <a:solidFill>
+            <a:schemeClr val="phClr">
+              <a:shade val="95000"/>
+              <a:satMod val="105000"/>
+            </a:schemeClr>
+          </a:solidFill>
+          <a:prstDash val="solid"/>
+        </a:ln>
+        <a:ln w="25400" cap="flat" cmpd="sng" algn="ctr">
+          <a:solidFill>
+            <a:schemeClr val="phClr"/>
+          </a:solidFill>
+          <a:prstDash val="solid"/>
+        </a:ln>
+        <a:ln w="38100" cap="flat" cmpd="sng" algn="ctr">
+          <a:solidFill>
+            <a:schemeClr val="phClr"/>
+          </a:solidFill>
+          <a:prstDash val="solid"/>
+        </a:ln>
+      </a:lnStyleLst>
+      <a:effectStyleLst>
+        <a:effectStyle>
+          <a:effectLst>
+            <a:outerShdw blurRad="40000" dist="20000" dir="5400000" rotWithShape="0">
+              <a:srgbClr val="000000">
+                <a:alpha val="38000"/>
+              </a:srgbClr>
+            </a:outerShdw>
+          </a:effectLst>
+        </a:effectStyle>
+        <a:effectStyle>
+          <a:effectLst>
+            <a:outerShdw blurRad="40000" dist="23000" dir="5400000" rotWithShape="0">
+              <a:srgbClr val="000000">
+                <a:alpha val="35000"/>
+              </a:srgbClr>
+            </a:outerShdw>
+          </a:effectLst>
+        </a:effectStyle>
+        <a:effectStyle>
+          <a:effectLst>
+            <a:outerShdw blurRad="40000" dist="23000" dir="5400000" rotWithShape="0">
+              <a:srgbClr val="000000">
+                <a:alpha val="35000"/>
+              </a:srgbClr>
+            </a:outerShdw>
+          </a:effectLst>
+          <a:scene3d>
+            <a:camera prst="orthographicFront">
+              <a:rot lat="0" lon="0" rev="0"/>
+            </a:camera>
+            <a:lightRig rig="threePt" dir="t">
+              <a:rot lat="0" lon="0" rev="1200000"/>
+            </a:lightRig>
+          </a:scene3d>
+          <a:sp3d>
+            <a:bevelT w="63500" h="25400"/>
+          </a:sp3d>
+        </a:effectStyle>
+      </a:effectStyleLst>
+      <a:bgFillStyleLst>
+        <a:solidFill>
+          <a:schemeClr val="phClr"/>
+        </a:solidFill>
+        <a:gradFill rotWithShape="1">
+          <a:gsLst>
+            <a:gs pos="0">
+              <a:schemeClr val="phClr">
+                <a:tint val="40000"/>
+                <a:satMod val="350000"/>
+              </a:schemeClr>
+            </a:gs>
+            <a:gs pos="40000">
+              <a:schemeClr val="phClr">
+                <a:tint val="45000"/>
+                <a:shade val="99000"/>
+                <a:satMod val="350000"/>
+              </a:schemeClr>
+            </a:gs>
+            <a:gs pos="100000">
+              <a:schemeClr val="phClr">
+                <a:shade val="20000"/>
+                <a:satMod val="255000"/>
+              </a:schemeClr>
+            </a:gs>
+          </a:gsLst>
+          <a:path path="circle">
+            <a:fillToRect l="50000" t="-80000" r="50000" b="180000"/>
+          </a:path>
+        </a:gradFill>
+        <a:gradFill rotWithShape="1">
+          <a:gsLst>
+            <a:gs pos="0">
+              <a:schemeClr val="phClr">
+                <a:tint val="80000"/>
+                <a:satMod val="300000"/>
+              </a:schemeClr>
+            </a:gs>
+            <a:gs pos="100000">
+              <a:schemeClr val="phClr">
+                <a:shade val="30000"/>
+                <a:satMod val="200000"/>
+              </a:schemeClr>
+            </a:gs>
+          </a:gsLst>
+          <a:path path="circle">
+            <a:fillToRect l="50000" t="50000" r="50000" b="50000"/>
+          </a:path>
+        </a:gradFill>
+      </a:bgFillStyleLst>
+    </a:fmtScheme>
+  </a:themeElements>
+</a:theme>
+</file>
+
+<file path=ppt/theme/theme2.xml><?xml version="1.0" encoding="utf-8"?>
 <a:theme xmlns:a="http://schemas.openxmlformats.org/drawingml/2006/main" xmlns:r="http://schemas.openxmlformats.org/officeDocument/2006/relationships" name="Elegant Black &amp; White Thesis Defense by Slidesgo">
   <a:themeElements>
     <a:clrScheme name="Simple Light">
@@ -37307,283 +37873,4 @@
     </a:fmtScheme>
   </a:themeElements>
 </a:theme>
-</file>
-
-<file path=ppt/theme/theme2.xml><?xml version="1.0" encoding="utf-8"?>
-<a:theme xmlns:a="http://schemas.openxmlformats.org/drawingml/2006/main" xmlns:r="http://schemas.openxmlformats.org/officeDocument/2006/relationships">
-  <a:themeElements>
-    <a:clrScheme name="Default">
-      <a:dk1>
-        <a:srgbClr val="000000"/>
-      </a:dk1>
-      <a:lt1>
-        <a:srgbClr val="FFFFFF"/>
-      </a:lt1>
-      <a:dk2>
-        <a:srgbClr val="158158"/>
-      </a:dk2>
-      <a:lt2>
-        <a:srgbClr val="F3F3F3"/>
-      </a:lt2>
-      <a:accent1>
-        <a:srgbClr val="058DC7"/>
-      </a:accent1>
-      <a:accent2>
-        <a:srgbClr val="50B432"/>
-      </a:accent2>
-      <a:accent3>
-        <a:srgbClr val="ED561B"/>
-      </a:accent3>
-      <a:accent4>
-        <a:srgbClr val="EDEF00"/>
-      </a:accent4>
-      <a:accent5>
-        <a:srgbClr val="24CBE5"/>
-      </a:accent5>
-      <a:accent6>
-        <a:srgbClr val="64E572"/>
-      </a:accent6>
-      <a:hlink>
-        <a:srgbClr val="2200CC"/>
-      </a:hlink>
-      <a:folHlink>
-        <a:srgbClr val="551A8B"/>
-      </a:folHlink>
-    </a:clrScheme>
-    <a:fontScheme name="Office">
-      <a:majorFont>
-        <a:latin typeface="Arial"/>
-        <a:ea typeface=""/>
-        <a:cs typeface=""/>
-        <a:font script="Jpan" typeface="ＭＳ Ｐゴシック"/>
-        <a:font script="Hang" typeface="맑은 고딕"/>
-        <a:font script="Hans" typeface="宋体"/>
-        <a:font script="Hant" typeface="新細明體"/>
-        <a:font script="Arab" typeface="Times New Roman"/>
-        <a:font script="Hebr" typeface="Times New Roman"/>
-        <a:font script="Thai" typeface="Angsana New"/>
-        <a:font script="Ethi" typeface="Nyala"/>
-        <a:font script="Beng" typeface="Vrinda"/>
-        <a:font script="Gujr" typeface="Shruti"/>
-        <a:font script="Khmr" typeface="MoolBoran"/>
-        <a:font script="Knda" typeface="Tunga"/>
-        <a:font script="Guru" typeface="Raavi"/>
-        <a:font script="Cans" typeface="Euphemia"/>
-        <a:font script="Cher" typeface="Plantagenet Cherokee"/>
-        <a:font script="Yiii" typeface="Microsoft Yi Baiti"/>
-        <a:font script="Tibt" typeface="Microsoft Himalaya"/>
-        <a:font script="Thaa" typeface="MV Boli"/>
-        <a:font script="Deva" typeface="Mangal"/>
-        <a:font script="Telu" typeface="Gautami"/>
-        <a:font script="Taml" typeface="Latha"/>
-        <a:font script="Syrc" typeface="Estrangelo Edessa"/>
-        <a:font script="Orya" typeface="Kalinga"/>
-        <a:font script="Mlym" typeface="Kartika"/>
-        <a:font script="Laoo" typeface="DokChampa"/>
-        <a:font script="Sinh" typeface="Iskoola Pota"/>
-        <a:font script="Mong" typeface="Mongolian Baiti"/>
-        <a:font script="Viet" typeface="Times New Roman"/>
-        <a:font script="Uigh" typeface="Microsoft Uighur"/>
-        <a:font script="Geor" typeface="Sylfaen"/>
-      </a:majorFont>
-      <a:minorFont>
-        <a:latin typeface="Arial"/>
-        <a:ea typeface=""/>
-        <a:cs typeface=""/>
-        <a:font script="Jpan" typeface="ＭＳ Ｐゴシック"/>
-        <a:font script="Hang" typeface="맑은 고딕"/>
-        <a:font script="Hans" typeface="宋体"/>
-        <a:font script="Hant" typeface="新細明體"/>
-        <a:font script="Arab" typeface="Arial"/>
-        <a:font script="Hebr" typeface="Arial"/>
-        <a:font script="Thai" typeface="Cordia New"/>
-        <a:font script="Ethi" typeface="Nyala"/>
-        <a:font script="Beng" typeface="Vrinda"/>
-        <a:font script="Gujr" typeface="Shruti"/>
-        <a:font script="Khmr" typeface="DaunPenh"/>
-        <a:font script="Knda" typeface="Tunga"/>
-        <a:font script="Guru" typeface="Raavi"/>
-        <a:font script="Cans" typeface="Euphemia"/>
-        <a:font script="Cher" typeface="Plantagenet Cherokee"/>
-        <a:font script="Yiii" typeface="Microsoft Yi Baiti"/>
-        <a:font script="Tibt" typeface="Microsoft Himalaya"/>
-        <a:font script="Thaa" typeface="MV Boli"/>
-        <a:font script="Deva" typeface="Mangal"/>
-        <a:font script="Telu" typeface="Gautami"/>
-        <a:font script="Taml" typeface="Latha"/>
-        <a:font script="Syrc" typeface="Estrangelo Edessa"/>
-        <a:font script="Orya" typeface="Kalinga"/>
-        <a:font script="Mlym" typeface="Kartika"/>
-        <a:font script="Laoo" typeface="DokChampa"/>
-        <a:font script="Sinh" typeface="Iskoola Pota"/>
-        <a:font script="Mong" typeface="Mongolian Baiti"/>
-        <a:font script="Viet" typeface="Arial"/>
-        <a:font script="Uigh" typeface="Microsoft Uighur"/>
-        <a:font script="Geor" typeface="Sylfaen"/>
-      </a:minorFont>
-    </a:fontScheme>
-    <a:fmtScheme name="Office">
-      <a:fillStyleLst>
-        <a:solidFill>
-          <a:schemeClr val="phClr"/>
-        </a:solidFill>
-        <a:gradFill rotWithShape="1">
-          <a:gsLst>
-            <a:gs pos="0">
-              <a:schemeClr val="phClr">
-                <a:tint val="50000"/>
-                <a:satMod val="300000"/>
-              </a:schemeClr>
-            </a:gs>
-            <a:gs pos="35000">
-              <a:schemeClr val="phClr">
-                <a:tint val="37000"/>
-                <a:satMod val="300000"/>
-              </a:schemeClr>
-            </a:gs>
-            <a:gs pos="100000">
-              <a:schemeClr val="phClr">
-                <a:tint val="15000"/>
-                <a:satMod val="350000"/>
-              </a:schemeClr>
-            </a:gs>
-          </a:gsLst>
-          <a:lin ang="16200000" scaled="1"/>
-        </a:gradFill>
-        <a:gradFill rotWithShape="1">
-          <a:gsLst>
-            <a:gs pos="0">
-              <a:schemeClr val="phClr">
-                <a:tint val="100000"/>
-                <a:shade val="100000"/>
-                <a:satMod val="130000"/>
-              </a:schemeClr>
-            </a:gs>
-            <a:gs pos="100000">
-              <a:schemeClr val="phClr">
-                <a:tint val="50000"/>
-                <a:shade val="100000"/>
-                <a:satMod val="350000"/>
-              </a:schemeClr>
-            </a:gs>
-          </a:gsLst>
-          <a:lin ang="16200000" scaled="0"/>
-        </a:gradFill>
-      </a:fillStyleLst>
-      <a:lnStyleLst>
-        <a:ln w="9525" cap="flat" cmpd="sng" algn="ctr">
-          <a:solidFill>
-            <a:schemeClr val="phClr">
-              <a:shade val="95000"/>
-              <a:satMod val="105000"/>
-            </a:schemeClr>
-          </a:solidFill>
-          <a:prstDash val="solid"/>
-        </a:ln>
-        <a:ln w="25400" cap="flat" cmpd="sng" algn="ctr">
-          <a:solidFill>
-            <a:schemeClr val="phClr"/>
-          </a:solidFill>
-          <a:prstDash val="solid"/>
-        </a:ln>
-        <a:ln w="38100" cap="flat" cmpd="sng" algn="ctr">
-          <a:solidFill>
-            <a:schemeClr val="phClr"/>
-          </a:solidFill>
-          <a:prstDash val="solid"/>
-        </a:ln>
-      </a:lnStyleLst>
-      <a:effectStyleLst>
-        <a:effectStyle>
-          <a:effectLst>
-            <a:outerShdw blurRad="40000" dist="20000" dir="5400000" rotWithShape="0">
-              <a:srgbClr val="000000">
-                <a:alpha val="38000"/>
-              </a:srgbClr>
-            </a:outerShdw>
-          </a:effectLst>
-        </a:effectStyle>
-        <a:effectStyle>
-          <a:effectLst>
-            <a:outerShdw blurRad="40000" dist="23000" dir="5400000" rotWithShape="0">
-              <a:srgbClr val="000000">
-                <a:alpha val="35000"/>
-              </a:srgbClr>
-            </a:outerShdw>
-          </a:effectLst>
-        </a:effectStyle>
-        <a:effectStyle>
-          <a:effectLst>
-            <a:outerShdw blurRad="40000" dist="23000" dir="5400000" rotWithShape="0">
-              <a:srgbClr val="000000">
-                <a:alpha val="35000"/>
-              </a:srgbClr>
-            </a:outerShdw>
-          </a:effectLst>
-          <a:scene3d>
-            <a:camera prst="orthographicFront">
-              <a:rot lat="0" lon="0" rev="0"/>
-            </a:camera>
-            <a:lightRig rig="threePt" dir="t">
-              <a:rot lat="0" lon="0" rev="1200000"/>
-            </a:lightRig>
-          </a:scene3d>
-          <a:sp3d>
-            <a:bevelT w="63500" h="25400"/>
-          </a:sp3d>
-        </a:effectStyle>
-      </a:effectStyleLst>
-      <a:bgFillStyleLst>
-        <a:solidFill>
-          <a:schemeClr val="phClr"/>
-        </a:solidFill>
-        <a:gradFill rotWithShape="1">
-          <a:gsLst>
-            <a:gs pos="0">
-              <a:schemeClr val="phClr">
-                <a:tint val="40000"/>
-                <a:satMod val="350000"/>
-              </a:schemeClr>
-            </a:gs>
-            <a:gs pos="40000">
-              <a:schemeClr val="phClr">
-                <a:tint val="45000"/>
-                <a:shade val="99000"/>
-                <a:satMod val="350000"/>
-              </a:schemeClr>
-            </a:gs>
-            <a:gs pos="100000">
-              <a:schemeClr val="phClr">
-                <a:shade val="20000"/>
-                <a:satMod val="255000"/>
-              </a:schemeClr>
-            </a:gs>
-          </a:gsLst>
-          <a:path path="circle">
-            <a:fillToRect l="50000" t="-80000" r="50000" b="180000"/>
-          </a:path>
-        </a:gradFill>
-        <a:gradFill rotWithShape="1">
-          <a:gsLst>
-            <a:gs pos="0">
-              <a:schemeClr val="phClr">
-                <a:tint val="80000"/>
-                <a:satMod val="300000"/>
-              </a:schemeClr>
-            </a:gs>
-            <a:gs pos="100000">
-              <a:schemeClr val="phClr">
-                <a:shade val="30000"/>
-                <a:satMod val="200000"/>
-              </a:schemeClr>
-            </a:gs>
-          </a:gsLst>
-          <a:path path="circle">
-            <a:fillToRect l="50000" t="50000" r="50000" b="50000"/>
-          </a:path>
-        </a:gradFill>
-      </a:bgFillStyleLst>
-    </a:fmtScheme>
-  </a:themeElements>
-</a:theme>
 </file>
</xml_diff>